<commit_message>
Incorporate Roberto's latest updates to the common profile (#246)
* Add files via upload

* Add files via upload

* Add files via upload

* Incorporate Roberto's latest suggestions
</commit_message>
<xml_diff>
--- a/profiles/community/tosca/common/sources/figures.pptx
+++ b/profiles/community/tosca/common/sources/figures.pptx
@@ -5,10 +5,11 @@
     <p:sldMasterId id="2147483648" r:id="rId1"/>
   </p:sldMasterIdLst>
   <p:notesMasterIdLst>
-    <p:notesMasterId r:id="rId3"/>
+    <p:notesMasterId r:id="rId4"/>
   </p:notesMasterIdLst>
   <p:sldIdLst>
     <p:sldId id="280" r:id="rId2"/>
+    <p:sldId id="281" r:id="rId3"/>
   </p:sldIdLst>
   <p:sldSz cx="12192000" cy="6858000"/>
   <p:notesSz cx="6858000" cy="9144000"/>
@@ -197,7 +198,7 @@
           <a:p>
             <a:fld id="{9BC9C640-FDAB-4920-985D-AE6877D6D812}" type="datetimeFigureOut">
               <a:rPr lang="en-US" smtClean="0"/>
-              <a:t>11/4/2025</a:t>
+              <a:t>11/11/2025</a:t>
             </a:fld>
             <a:endParaRPr lang="en-US"/>
           </a:p>
@@ -611,7 +612,7 @@
           <a:p>
             <a:fld id="{7588158F-7D22-4D02-A7C1-554F35EEE72C}" type="datetimeFigureOut">
               <a:rPr lang="en-US" smtClean="0"/>
-              <a:t>11/4/2025</a:t>
+              <a:t>11/11/2025</a:t>
             </a:fld>
             <a:endParaRPr lang="en-US"/>
           </a:p>
@@ -809,7 +810,7 @@
           <a:p>
             <a:fld id="{7588158F-7D22-4D02-A7C1-554F35EEE72C}" type="datetimeFigureOut">
               <a:rPr lang="en-US" smtClean="0"/>
-              <a:t>11/4/2025</a:t>
+              <a:t>11/11/2025</a:t>
             </a:fld>
             <a:endParaRPr lang="en-US"/>
           </a:p>
@@ -1017,7 +1018,7 @@
           <a:p>
             <a:fld id="{7588158F-7D22-4D02-A7C1-554F35EEE72C}" type="datetimeFigureOut">
               <a:rPr lang="en-US" smtClean="0"/>
-              <a:t>11/4/2025</a:t>
+              <a:t>11/11/2025</a:t>
             </a:fld>
             <a:endParaRPr lang="en-US"/>
           </a:p>
@@ -1215,7 +1216,7 @@
           <a:p>
             <a:fld id="{7588158F-7D22-4D02-A7C1-554F35EEE72C}" type="datetimeFigureOut">
               <a:rPr lang="en-US" smtClean="0"/>
-              <a:t>11/4/2025</a:t>
+              <a:t>11/11/2025</a:t>
             </a:fld>
             <a:endParaRPr lang="en-US"/>
           </a:p>
@@ -1490,7 +1491,7 @@
           <a:p>
             <a:fld id="{7588158F-7D22-4D02-A7C1-554F35EEE72C}" type="datetimeFigureOut">
               <a:rPr lang="en-US" smtClean="0"/>
-              <a:t>11/4/2025</a:t>
+              <a:t>11/11/2025</a:t>
             </a:fld>
             <a:endParaRPr lang="en-US"/>
           </a:p>
@@ -1755,7 +1756,7 @@
           <a:p>
             <a:fld id="{7588158F-7D22-4D02-A7C1-554F35EEE72C}" type="datetimeFigureOut">
               <a:rPr lang="en-US" smtClean="0"/>
-              <a:t>11/4/2025</a:t>
+              <a:t>11/11/2025</a:t>
             </a:fld>
             <a:endParaRPr lang="en-US"/>
           </a:p>
@@ -2167,7 +2168,7 @@
           <a:p>
             <a:fld id="{7588158F-7D22-4D02-A7C1-554F35EEE72C}" type="datetimeFigureOut">
               <a:rPr lang="en-US" smtClean="0"/>
-              <a:t>11/4/2025</a:t>
+              <a:t>11/11/2025</a:t>
             </a:fld>
             <a:endParaRPr lang="en-US"/>
           </a:p>
@@ -2308,7 +2309,7 @@
           <a:p>
             <a:fld id="{7588158F-7D22-4D02-A7C1-554F35EEE72C}" type="datetimeFigureOut">
               <a:rPr lang="en-US" smtClean="0"/>
-              <a:t>11/4/2025</a:t>
+              <a:t>11/11/2025</a:t>
             </a:fld>
             <a:endParaRPr lang="en-US"/>
           </a:p>
@@ -2421,7 +2422,7 @@
           <a:p>
             <a:fld id="{7588158F-7D22-4D02-A7C1-554F35EEE72C}" type="datetimeFigureOut">
               <a:rPr lang="en-US" smtClean="0"/>
-              <a:t>11/4/2025</a:t>
+              <a:t>11/11/2025</a:t>
             </a:fld>
             <a:endParaRPr lang="en-US"/>
           </a:p>
@@ -2732,7 +2733,7 @@
           <a:p>
             <a:fld id="{7588158F-7D22-4D02-A7C1-554F35EEE72C}" type="datetimeFigureOut">
               <a:rPr lang="en-US" smtClean="0"/>
-              <a:t>11/4/2025</a:t>
+              <a:t>11/11/2025</a:t>
             </a:fld>
             <a:endParaRPr lang="en-US"/>
           </a:p>
@@ -3020,7 +3021,7 @@
           <a:p>
             <a:fld id="{7588158F-7D22-4D02-A7C1-554F35EEE72C}" type="datetimeFigureOut">
               <a:rPr lang="en-US" smtClean="0"/>
-              <a:t>11/4/2025</a:t>
+              <a:t>11/11/2025</a:t>
             </a:fld>
             <a:endParaRPr lang="en-US"/>
           </a:p>
@@ -3261,7 +3262,7 @@
           <a:p>
             <a:fld id="{7588158F-7D22-4D02-A7C1-554F35EEE72C}" type="datetimeFigureOut">
               <a:rPr lang="en-US" smtClean="0"/>
-              <a:t>11/4/2025</a:t>
+              <a:t>11/11/2025</a:t>
             </a:fld>
             <a:endParaRPr lang="en-US"/>
           </a:p>
@@ -5748,6 +5749,3312 @@
 </p:sld>
 </file>
 
+<file path=ppt/slides/slide2.xml><?xml version="1.0" encoding="utf-8"?>
+<p:sld xmlns:a="http://schemas.openxmlformats.org/drawingml/2006/main" xmlns:r="http://schemas.openxmlformats.org/officeDocument/2006/relationships" xmlns:p="http://schemas.openxmlformats.org/presentationml/2006/main">
+  <p:cSld>
+    <p:spTree>
+      <p:nvGrpSpPr>
+        <p:cNvPr id="1" name="">
+          <a:extLst>
+            <a:ext uri="{FF2B5EF4-FFF2-40B4-BE49-F238E27FC236}">
+              <a16:creationId xmlns:a16="http://schemas.microsoft.com/office/drawing/2014/main" id="{31F69EE4-7FE0-45F7-B471-D953590CA7C7}"/>
+            </a:ext>
+          </a:extLst>
+        </p:cNvPr>
+        <p:cNvGrpSpPr/>
+        <p:nvPr/>
+      </p:nvGrpSpPr>
+      <p:grpSpPr>
+        <a:xfrm>
+          <a:off x="0" y="0"/>
+          <a:ext cx="0" cy="0"/>
+          <a:chOff x="0" y="0"/>
+          <a:chExt cx="0" cy="0"/>
+        </a:xfrm>
+      </p:grpSpPr>
+      <p:sp>
+        <p:nvSpPr>
+          <p:cNvPr id="2" name="Rectangle: Rounded Corners 54">
+            <a:extLst>
+              <a:ext uri="{FF2B5EF4-FFF2-40B4-BE49-F238E27FC236}">
+                <a16:creationId xmlns:a16="http://schemas.microsoft.com/office/drawing/2014/main" id="{77890FD2-8D6E-900E-D156-CA2FD989D47E}"/>
+              </a:ext>
+            </a:extLst>
+          </p:cNvPr>
+          <p:cNvSpPr/>
+          <p:nvPr/>
+        </p:nvSpPr>
+        <p:spPr>
+          <a:xfrm>
+            <a:off x="4559424" y="1760643"/>
+            <a:ext cx="3017520" cy="4575501"/>
+          </a:xfrm>
+          <a:prstGeom prst="roundRect">
+            <a:avLst/>
+          </a:prstGeom>
+          <a:noFill/>
+          <a:ln w="19050">
+            <a:prstDash val="sysDash"/>
+          </a:ln>
+        </p:spPr>
+        <p:style>
+          <a:lnRef idx="2">
+            <a:schemeClr val="accent1">
+              <a:shade val="15000"/>
+            </a:schemeClr>
+          </a:lnRef>
+          <a:fillRef idx="1">
+            <a:schemeClr val="accent1"/>
+          </a:fillRef>
+          <a:effectRef idx="0">
+            <a:schemeClr val="accent1"/>
+          </a:effectRef>
+          <a:fontRef idx="minor">
+            <a:schemeClr val="lt1"/>
+          </a:fontRef>
+        </p:style>
+        <p:txBody>
+          <a:bodyPr rtlCol="0" anchor="t" anchorCtr="0"/>
+          <a:lstStyle/>
+          <a:p>
+            <a:r>
+              <a:rPr lang="en-US" sz="1100" dirty="0">
+                <a:solidFill>
+                  <a:schemeClr val="tx1"/>
+                </a:solidFill>
+              </a:rPr>
+              <a:t>Service Template</a:t>
+            </a:r>
+          </a:p>
+        </p:txBody>
+      </p:sp>
+      <p:sp>
+        <p:nvSpPr>
+          <p:cNvPr id="9" name="Rectangle 22">
+            <a:extLst>
+              <a:ext uri="{FF2B5EF4-FFF2-40B4-BE49-F238E27FC236}">
+                <a16:creationId xmlns:a16="http://schemas.microsoft.com/office/drawing/2014/main" id="{25A246BC-BFA7-39C9-5F0D-DD33D886B9C0}"/>
+              </a:ext>
+            </a:extLst>
+          </p:cNvPr>
+          <p:cNvSpPr/>
+          <p:nvPr/>
+        </p:nvSpPr>
+        <p:spPr>
+          <a:xfrm>
+            <a:off x="4840709" y="2413214"/>
+            <a:ext cx="771421" cy="279919"/>
+          </a:xfrm>
+          <a:prstGeom prst="rect">
+            <a:avLst/>
+          </a:prstGeom>
+          <a:solidFill>
+            <a:schemeClr val="bg1">
+              <a:lumMod val="95000"/>
+            </a:schemeClr>
+          </a:solidFill>
+          <a:ln w="19050">
+            <a:solidFill>
+              <a:schemeClr val="bg2"/>
+            </a:solidFill>
+          </a:ln>
+        </p:spPr>
+        <p:style>
+          <a:lnRef idx="2">
+            <a:schemeClr val="accent1">
+              <a:shade val="50000"/>
+            </a:schemeClr>
+          </a:lnRef>
+          <a:fillRef idx="1">
+            <a:schemeClr val="accent1"/>
+          </a:fillRef>
+          <a:effectRef idx="0">
+            <a:schemeClr val="accent1"/>
+          </a:effectRef>
+          <a:fontRef idx="minor">
+            <a:schemeClr val="lt1"/>
+          </a:fontRef>
+        </p:style>
+        <p:txBody>
+          <a:bodyPr lIns="0" rIns="0" rtlCol="0" anchor="ctr"/>
+          <a:lstStyle/>
+          <a:p>
+            <a:pPr marL="0" marR="0" lvl="0" indent="0" algn="ctr" defTabSz="914400" rtl="0" eaLnBrk="1" fontAlgn="auto" latinLnBrk="0" hangingPunct="1">
+              <a:lnSpc>
+                <a:spcPct val="100000"/>
+              </a:lnSpc>
+              <a:spcBef>
+                <a:spcPts val="0"/>
+              </a:spcBef>
+              <a:spcAft>
+                <a:spcPts val="0"/>
+              </a:spcAft>
+              <a:buClrTx/>
+              <a:buSzTx/>
+              <a:buFontTx/>
+              <a:buNone/>
+              <a:tabLst/>
+              <a:defRPr/>
+            </a:pPr>
+            <a:r>
+              <a:rPr kumimoji="0" lang="en-US" sz="900" b="0" i="0" u="none" strike="noStrike" kern="1200" cap="none" spc="0" normalizeH="0" baseline="0" noProof="0" dirty="0">
+                <a:ln>
+                  <a:noFill/>
+                </a:ln>
+                <a:solidFill>
+                  <a:prstClr val="black"/>
+                </a:solidFill>
+                <a:effectLst/>
+                <a:uLnTx/>
+                <a:uFillTx/>
+                <a:ea typeface="+mn-ea"/>
+                <a:cs typeface="+mn-cs"/>
+              </a:rPr>
+              <a:t>Application</a:t>
+            </a:r>
+          </a:p>
+        </p:txBody>
+      </p:sp>
+      <p:sp>
+        <p:nvSpPr>
+          <p:cNvPr id="10" name="Rectangle: Rounded Corners 23">
+            <a:extLst>
+              <a:ext uri="{FF2B5EF4-FFF2-40B4-BE49-F238E27FC236}">
+                <a16:creationId xmlns:a16="http://schemas.microsoft.com/office/drawing/2014/main" id="{88F2A918-D067-D4C2-0033-62CF6A6E550E}"/>
+              </a:ext>
+            </a:extLst>
+          </p:cNvPr>
+          <p:cNvSpPr/>
+          <p:nvPr/>
+        </p:nvSpPr>
+        <p:spPr>
+          <a:xfrm>
+            <a:off x="4840709" y="2173408"/>
+            <a:ext cx="771420" cy="815478"/>
+          </a:xfrm>
+          <a:prstGeom prst="roundRect">
+            <a:avLst/>
+          </a:prstGeom>
+          <a:noFill/>
+          <a:ln w="19050">
+            <a:solidFill>
+              <a:schemeClr val="tx1"/>
+            </a:solidFill>
+          </a:ln>
+        </p:spPr>
+        <p:style>
+          <a:lnRef idx="2">
+            <a:schemeClr val="accent1">
+              <a:shade val="50000"/>
+            </a:schemeClr>
+          </a:lnRef>
+          <a:fillRef idx="1">
+            <a:schemeClr val="accent1"/>
+          </a:fillRef>
+          <a:effectRef idx="0">
+            <a:schemeClr val="accent1"/>
+          </a:effectRef>
+          <a:fontRef idx="minor">
+            <a:schemeClr val="lt1"/>
+          </a:fontRef>
+        </p:style>
+        <p:txBody>
+          <a:bodyPr tIns="0" rtlCol="0" anchor="t" anchorCtr="0"/>
+          <a:lstStyle/>
+          <a:p>
+            <a:pPr marL="0" marR="0" lvl="0" indent="0" algn="l" defTabSz="914400" rtl="0" eaLnBrk="1" fontAlgn="auto" latinLnBrk="0" hangingPunct="1">
+              <a:lnSpc>
+                <a:spcPct val="100000"/>
+              </a:lnSpc>
+              <a:spcBef>
+                <a:spcPts val="0"/>
+              </a:spcBef>
+              <a:spcAft>
+                <a:spcPts val="0"/>
+              </a:spcAft>
+              <a:buClrTx/>
+              <a:buSzTx/>
+              <a:buFontTx/>
+              <a:buNone/>
+              <a:tabLst/>
+              <a:defRPr/>
+            </a:pPr>
+            <a:r>
+              <a:rPr kumimoji="0" lang="en-US" sz="800" b="0" i="0" u="none" strike="noStrike" kern="1200" cap="none" spc="0" normalizeH="0" baseline="0" noProof="0" dirty="0">
+                <a:ln>
+                  <a:noFill/>
+                </a:ln>
+                <a:solidFill>
+                  <a:prstClr val="black"/>
+                </a:solidFill>
+                <a:effectLst/>
+                <a:uLnTx/>
+                <a:uFillTx/>
+                <a:ea typeface="+mn-ea"/>
+                <a:cs typeface="+mn-cs"/>
+              </a:rPr>
+              <a:t>application</a:t>
+            </a:r>
+          </a:p>
+        </p:txBody>
+      </p:sp>
+      <p:sp>
+        <p:nvSpPr>
+          <p:cNvPr id="11" name="Flowchart: Off-page Connector 24">
+            <a:extLst>
+              <a:ext uri="{FF2B5EF4-FFF2-40B4-BE49-F238E27FC236}">
+                <a16:creationId xmlns:a16="http://schemas.microsoft.com/office/drawing/2014/main" id="{426B76DE-5610-D7DA-6D77-9209AFE12EAF}"/>
+              </a:ext>
+            </a:extLst>
+          </p:cNvPr>
+          <p:cNvSpPr/>
+          <p:nvPr/>
+        </p:nvSpPr>
+        <p:spPr>
+          <a:xfrm>
+            <a:off x="5122566" y="2867588"/>
+            <a:ext cx="180000" cy="270000"/>
+          </a:xfrm>
+          <a:prstGeom prst="flowChartOffpageConnector">
+            <a:avLst/>
+          </a:prstGeom>
+          <a:solidFill>
+            <a:schemeClr val="bg1"/>
+          </a:solidFill>
+          <a:ln w="19050">
+            <a:solidFill>
+              <a:schemeClr val="tx1"/>
+            </a:solidFill>
+          </a:ln>
+        </p:spPr>
+        <p:style>
+          <a:lnRef idx="2">
+            <a:schemeClr val="accent1">
+              <a:shade val="50000"/>
+            </a:schemeClr>
+          </a:lnRef>
+          <a:fillRef idx="1">
+            <a:schemeClr val="accent1"/>
+          </a:fillRef>
+          <a:effectRef idx="0">
+            <a:schemeClr val="accent1"/>
+          </a:effectRef>
+          <a:fontRef idx="minor">
+            <a:schemeClr val="lt1"/>
+          </a:fontRef>
+        </p:style>
+        <p:txBody>
+          <a:bodyPr tIns="0" rtlCol="0" anchor="t" anchorCtr="0"/>
+          <a:lstStyle/>
+          <a:p>
+            <a:pPr marL="0" marR="0" lvl="0" indent="0" algn="l" defTabSz="914400" rtl="0" eaLnBrk="1" fontAlgn="auto" latinLnBrk="0" hangingPunct="1">
+              <a:lnSpc>
+                <a:spcPct val="100000"/>
+              </a:lnSpc>
+              <a:spcBef>
+                <a:spcPts val="0"/>
+              </a:spcBef>
+              <a:spcAft>
+                <a:spcPts val="0"/>
+              </a:spcAft>
+              <a:buClrTx/>
+              <a:buSzTx/>
+              <a:buFontTx/>
+              <a:buNone/>
+              <a:tabLst/>
+              <a:defRPr/>
+            </a:pPr>
+            <a:endParaRPr kumimoji="0" lang="en-US" sz="1000" b="0" i="0" u="none" strike="noStrike" kern="1200" cap="none" spc="0" normalizeH="0" baseline="0" noProof="0">
+              <a:ln>
+                <a:noFill/>
+              </a:ln>
+              <a:solidFill>
+                <a:prstClr val="black"/>
+              </a:solidFill>
+              <a:effectLst/>
+              <a:uLnTx/>
+              <a:uFillTx/>
+              <a:ea typeface="+mn-ea"/>
+              <a:cs typeface="+mn-cs"/>
+            </a:endParaRPr>
+          </a:p>
+        </p:txBody>
+      </p:sp>
+      <p:cxnSp>
+        <p:nvCxnSpPr>
+          <p:cNvPr id="13" name="Straight Arrow Connector 45">
+            <a:extLst>
+              <a:ext uri="{FF2B5EF4-FFF2-40B4-BE49-F238E27FC236}">
+                <a16:creationId xmlns:a16="http://schemas.microsoft.com/office/drawing/2014/main" id="{1F1C51ED-02C8-92BB-C02E-17A3DE6ACB56}"/>
+              </a:ext>
+            </a:extLst>
+          </p:cNvPr>
+          <p:cNvCxnSpPr>
+            <a:cxnSpLocks/>
+            <a:stCxn id="11" idx="2"/>
+            <a:endCxn id="6" idx="1"/>
+          </p:cNvCxnSpPr>
+          <p:nvPr/>
+        </p:nvCxnSpPr>
+        <p:spPr>
+          <a:xfrm flipH="1">
+            <a:off x="5067922" y="3137588"/>
+            <a:ext cx="144644" cy="436810"/>
+          </a:xfrm>
+          <a:prstGeom prst="straightConnector1">
+            <a:avLst/>
+          </a:prstGeom>
+          <a:ln w="12700">
+            <a:solidFill>
+              <a:schemeClr val="tx1"/>
+            </a:solidFill>
+            <a:tailEnd type="triangle"/>
+          </a:ln>
+        </p:spPr>
+        <p:style>
+          <a:lnRef idx="1">
+            <a:schemeClr val="accent1"/>
+          </a:lnRef>
+          <a:fillRef idx="0">
+            <a:schemeClr val="accent1"/>
+          </a:fillRef>
+          <a:effectRef idx="0">
+            <a:schemeClr val="accent1"/>
+          </a:effectRef>
+          <a:fontRef idx="minor">
+            <a:schemeClr val="tx1"/>
+          </a:fontRef>
+        </p:style>
+      </p:cxnSp>
+      <p:sp>
+        <p:nvSpPr>
+          <p:cNvPr id="16" name="CasellaDiTesto 15">
+            <a:extLst>
+              <a:ext uri="{FF2B5EF4-FFF2-40B4-BE49-F238E27FC236}">
+                <a16:creationId xmlns:a16="http://schemas.microsoft.com/office/drawing/2014/main" id="{DA8986F7-96D6-0416-2ECC-EC987B5E7E69}"/>
+              </a:ext>
+            </a:extLst>
+          </p:cNvPr>
+          <p:cNvSpPr txBox="1"/>
+          <p:nvPr/>
+        </p:nvSpPr>
+        <p:spPr>
+          <a:xfrm>
+            <a:off x="4710434" y="3243520"/>
+            <a:ext cx="895928" cy="138499"/>
+          </a:xfrm>
+          <a:prstGeom prst="rect">
+            <a:avLst/>
+          </a:prstGeom>
+          <a:solidFill>
+            <a:schemeClr val="bg1"/>
+          </a:solidFill>
+        </p:spPr>
+        <p:txBody>
+          <a:bodyPr wrap="square" lIns="0" tIns="0" rIns="0" bIns="0" rtlCol="0">
+            <a:spAutoFit/>
+          </a:bodyPr>
+          <a:lstStyle/>
+          <a:p>
+            <a:pPr algn="ctr"/>
+            <a:r>
+              <a:rPr lang="it-IT" sz="900" dirty="0" err="1"/>
+              <a:t>RunsOn</a:t>
+            </a:r>
+            <a:endParaRPr lang="it-IT" sz="900" dirty="0"/>
+          </a:p>
+        </p:txBody>
+      </p:sp>
+      <p:sp>
+        <p:nvSpPr>
+          <p:cNvPr id="17" name="Rectangle: Rounded Corners 63">
+            <a:extLst>
+              <a:ext uri="{FF2B5EF4-FFF2-40B4-BE49-F238E27FC236}">
+                <a16:creationId xmlns:a16="http://schemas.microsoft.com/office/drawing/2014/main" id="{AE177950-CC52-144F-D213-33D09D903095}"/>
+              </a:ext>
+            </a:extLst>
+          </p:cNvPr>
+          <p:cNvSpPr/>
+          <p:nvPr/>
+        </p:nvSpPr>
+        <p:spPr>
+          <a:xfrm>
+            <a:off x="3576663" y="424687"/>
+            <a:ext cx="1545903" cy="1083735"/>
+          </a:xfrm>
+          <a:prstGeom prst="roundRect">
+            <a:avLst/>
+          </a:prstGeom>
+          <a:noFill/>
+          <a:ln w="19050">
+            <a:prstDash val="sysDash"/>
+          </a:ln>
+        </p:spPr>
+        <p:style>
+          <a:lnRef idx="2">
+            <a:schemeClr val="accent1">
+              <a:shade val="15000"/>
+            </a:schemeClr>
+          </a:lnRef>
+          <a:fillRef idx="1">
+            <a:schemeClr val="accent1"/>
+          </a:fillRef>
+          <a:effectRef idx="0">
+            <a:schemeClr val="accent1"/>
+          </a:effectRef>
+          <a:fontRef idx="minor">
+            <a:schemeClr val="lt1"/>
+          </a:fontRef>
+        </p:style>
+        <p:txBody>
+          <a:bodyPr rtlCol="0" anchor="ctr" anchorCtr="0"/>
+          <a:lstStyle/>
+          <a:p>
+            <a:pPr algn="ctr"/>
+            <a:r>
+              <a:rPr lang="en-US" sz="1100" dirty="0">
+                <a:solidFill>
+                  <a:schemeClr val="tx1"/>
+                </a:solidFill>
+              </a:rPr>
+              <a:t>Substituting</a:t>
+            </a:r>
+            <a:br>
+              <a:rPr lang="en-US" sz="1100" dirty="0">
+                <a:solidFill>
+                  <a:schemeClr val="tx1"/>
+                </a:solidFill>
+              </a:rPr>
+            </a:br>
+            <a:r>
+              <a:rPr lang="en-US" sz="1100" dirty="0">
+                <a:solidFill>
+                  <a:schemeClr val="tx1"/>
+                </a:solidFill>
+              </a:rPr>
+              <a:t>Service Template</a:t>
+            </a:r>
+            <a:br>
+              <a:rPr lang="en-US" sz="1100" dirty="0">
+                <a:solidFill>
+                  <a:schemeClr val="tx1"/>
+                </a:solidFill>
+              </a:rPr>
+            </a:br>
+            <a:r>
+              <a:rPr lang="en-US" sz="1100" dirty="0">
+                <a:solidFill>
+                  <a:schemeClr val="tx1"/>
+                </a:solidFill>
+              </a:rPr>
+              <a:t>(Application)</a:t>
+            </a:r>
+          </a:p>
+        </p:txBody>
+      </p:sp>
+      <p:cxnSp>
+        <p:nvCxnSpPr>
+          <p:cNvPr id="18" name="Straight Arrow Connector 134">
+            <a:extLst>
+              <a:ext uri="{FF2B5EF4-FFF2-40B4-BE49-F238E27FC236}">
+                <a16:creationId xmlns:a16="http://schemas.microsoft.com/office/drawing/2014/main" id="{D9975BE2-D130-7F89-7420-CB1C3A1DE908}"/>
+              </a:ext>
+            </a:extLst>
+          </p:cNvPr>
+          <p:cNvCxnSpPr>
+            <a:cxnSpLocks/>
+            <a:stCxn id="10" idx="0"/>
+            <a:endCxn id="17" idx="2"/>
+          </p:cNvCxnSpPr>
+          <p:nvPr/>
+        </p:nvCxnSpPr>
+        <p:spPr>
+          <a:xfrm flipH="1" flipV="1">
+            <a:off x="4349615" y="1508422"/>
+            <a:ext cx="876804" cy="664986"/>
+          </a:xfrm>
+          <a:prstGeom prst="straightConnector1">
+            <a:avLst/>
+          </a:prstGeom>
+          <a:ln w="28575">
+            <a:solidFill>
+              <a:schemeClr val="accent2"/>
+            </a:solidFill>
+            <a:prstDash val="sysDash"/>
+            <a:headEnd type="triangle" w="med" len="med"/>
+            <a:tailEnd type="none" w="med" len="med"/>
+          </a:ln>
+        </p:spPr>
+        <p:style>
+          <a:lnRef idx="1">
+            <a:schemeClr val="accent1"/>
+          </a:lnRef>
+          <a:fillRef idx="0">
+            <a:schemeClr val="accent1"/>
+          </a:fillRef>
+          <a:effectRef idx="0">
+            <a:schemeClr val="accent1"/>
+          </a:effectRef>
+          <a:fontRef idx="minor">
+            <a:schemeClr val="tx1"/>
+          </a:fontRef>
+        </p:style>
+      </p:cxnSp>
+      <p:sp>
+        <p:nvSpPr>
+          <p:cNvPr id="19" name="TextBox 135">
+            <a:extLst>
+              <a:ext uri="{FF2B5EF4-FFF2-40B4-BE49-F238E27FC236}">
+                <a16:creationId xmlns:a16="http://schemas.microsoft.com/office/drawing/2014/main" id="{AD455239-372B-79A0-3540-1FA82ADB2F6B}"/>
+              </a:ext>
+            </a:extLst>
+          </p:cNvPr>
+          <p:cNvSpPr txBox="1"/>
+          <p:nvPr/>
+        </p:nvSpPr>
+        <p:spPr>
+          <a:xfrm>
+            <a:off x="3924884" y="1641541"/>
+            <a:ext cx="533800" cy="138499"/>
+          </a:xfrm>
+          <a:prstGeom prst="rect">
+            <a:avLst/>
+          </a:prstGeom>
+          <a:solidFill>
+            <a:schemeClr val="bg1"/>
+          </a:solidFill>
+        </p:spPr>
+        <p:txBody>
+          <a:bodyPr wrap="square" lIns="0" tIns="0" rIns="0" bIns="0" rtlCol="0">
+            <a:spAutoFit/>
+          </a:bodyPr>
+          <a:lstStyle/>
+          <a:p>
+            <a:pPr algn="ctr"/>
+            <a:r>
+              <a:rPr lang="en-US" sz="900" b="1" dirty="0"/>
+              <a:t>substitutes</a:t>
+            </a:r>
+          </a:p>
+        </p:txBody>
+      </p:sp>
+      <p:sp>
+        <p:nvSpPr>
+          <p:cNvPr id="23" name="Rectangle: Rounded Corners 63">
+            <a:extLst>
+              <a:ext uri="{FF2B5EF4-FFF2-40B4-BE49-F238E27FC236}">
+                <a16:creationId xmlns:a16="http://schemas.microsoft.com/office/drawing/2014/main" id="{2DC3AFA3-3D17-9E41-F0EF-473A16B6C512}"/>
+              </a:ext>
+            </a:extLst>
+          </p:cNvPr>
+          <p:cNvSpPr/>
+          <p:nvPr/>
+        </p:nvSpPr>
+        <p:spPr>
+          <a:xfrm>
+            <a:off x="2761143" y="4771901"/>
+            <a:ext cx="1545903" cy="1083735"/>
+          </a:xfrm>
+          <a:prstGeom prst="roundRect">
+            <a:avLst/>
+          </a:prstGeom>
+          <a:noFill/>
+          <a:ln w="19050">
+            <a:prstDash val="sysDash"/>
+          </a:ln>
+        </p:spPr>
+        <p:style>
+          <a:lnRef idx="2">
+            <a:schemeClr val="accent1">
+              <a:shade val="15000"/>
+            </a:schemeClr>
+          </a:lnRef>
+          <a:fillRef idx="1">
+            <a:schemeClr val="accent1"/>
+          </a:fillRef>
+          <a:effectRef idx="0">
+            <a:schemeClr val="accent1"/>
+          </a:effectRef>
+          <a:fontRef idx="minor">
+            <a:schemeClr val="lt1"/>
+          </a:fontRef>
+        </p:style>
+        <p:txBody>
+          <a:bodyPr rtlCol="0" anchor="ctr" anchorCtr="0"/>
+          <a:lstStyle/>
+          <a:p>
+            <a:pPr algn="ctr"/>
+            <a:r>
+              <a:rPr lang="en-US" sz="1100" dirty="0">
+                <a:solidFill>
+                  <a:schemeClr val="tx1"/>
+                </a:solidFill>
+              </a:rPr>
+              <a:t>Substituting</a:t>
+            </a:r>
+            <a:br>
+              <a:rPr lang="en-US" sz="1100" dirty="0">
+                <a:solidFill>
+                  <a:schemeClr val="tx1"/>
+                </a:solidFill>
+              </a:rPr>
+            </a:br>
+            <a:r>
+              <a:rPr lang="en-US" sz="1100" dirty="0">
+                <a:solidFill>
+                  <a:schemeClr val="tx1"/>
+                </a:solidFill>
+              </a:rPr>
+              <a:t>Service Template</a:t>
+            </a:r>
+            <a:br>
+              <a:rPr lang="en-US" sz="1100" dirty="0">
+                <a:solidFill>
+                  <a:schemeClr val="tx1"/>
+                </a:solidFill>
+              </a:rPr>
+            </a:br>
+            <a:r>
+              <a:rPr lang="en-US" sz="1100" dirty="0">
+                <a:solidFill>
+                  <a:schemeClr val="tx1"/>
+                </a:solidFill>
+              </a:rPr>
+              <a:t>(Platform)</a:t>
+            </a:r>
+          </a:p>
+        </p:txBody>
+      </p:sp>
+      <p:cxnSp>
+        <p:nvCxnSpPr>
+          <p:cNvPr id="24" name="Straight Arrow Connector 134">
+            <a:extLst>
+              <a:ext uri="{FF2B5EF4-FFF2-40B4-BE49-F238E27FC236}">
+                <a16:creationId xmlns:a16="http://schemas.microsoft.com/office/drawing/2014/main" id="{6996D3A0-9C32-DD59-E3B1-9051093788D9}"/>
+              </a:ext>
+            </a:extLst>
+          </p:cNvPr>
+          <p:cNvCxnSpPr>
+            <a:cxnSpLocks/>
+            <a:stCxn id="5" idx="1"/>
+            <a:endCxn id="23" idx="0"/>
+          </p:cNvCxnSpPr>
+          <p:nvPr/>
+        </p:nvCxnSpPr>
+        <p:spPr>
+          <a:xfrm flipH="1">
+            <a:off x="3534095" y="4086312"/>
+            <a:ext cx="1306613" cy="685589"/>
+          </a:xfrm>
+          <a:prstGeom prst="straightConnector1">
+            <a:avLst/>
+          </a:prstGeom>
+          <a:ln w="28575">
+            <a:solidFill>
+              <a:schemeClr val="accent2"/>
+            </a:solidFill>
+            <a:prstDash val="sysDash"/>
+            <a:headEnd type="triangle" w="med" len="med"/>
+            <a:tailEnd type="none" w="med" len="med"/>
+          </a:ln>
+        </p:spPr>
+        <p:style>
+          <a:lnRef idx="1">
+            <a:schemeClr val="accent1"/>
+          </a:lnRef>
+          <a:fillRef idx="0">
+            <a:schemeClr val="accent1"/>
+          </a:fillRef>
+          <a:effectRef idx="0">
+            <a:schemeClr val="accent1"/>
+          </a:effectRef>
+          <a:fontRef idx="minor">
+            <a:schemeClr val="tx1"/>
+          </a:fontRef>
+        </p:style>
+      </p:cxnSp>
+      <p:sp>
+        <p:nvSpPr>
+          <p:cNvPr id="27" name="TextBox 135">
+            <a:extLst>
+              <a:ext uri="{FF2B5EF4-FFF2-40B4-BE49-F238E27FC236}">
+                <a16:creationId xmlns:a16="http://schemas.microsoft.com/office/drawing/2014/main" id="{FD824240-3570-B830-7890-C2AEB57022AC}"/>
+              </a:ext>
+            </a:extLst>
+          </p:cNvPr>
+          <p:cNvSpPr txBox="1"/>
+          <p:nvPr/>
+        </p:nvSpPr>
+        <p:spPr>
+          <a:xfrm>
+            <a:off x="3843750" y="4359857"/>
+            <a:ext cx="533800" cy="138499"/>
+          </a:xfrm>
+          <a:prstGeom prst="rect">
+            <a:avLst/>
+          </a:prstGeom>
+          <a:solidFill>
+            <a:schemeClr val="bg1"/>
+          </a:solidFill>
+        </p:spPr>
+        <p:txBody>
+          <a:bodyPr wrap="square" lIns="0" tIns="0" rIns="0" bIns="0" rtlCol="0">
+            <a:spAutoFit/>
+          </a:bodyPr>
+          <a:lstStyle/>
+          <a:p>
+            <a:pPr algn="ctr"/>
+            <a:r>
+              <a:rPr lang="en-US" sz="900" b="1" dirty="0"/>
+              <a:t>substitutes</a:t>
+            </a:r>
+          </a:p>
+        </p:txBody>
+      </p:sp>
+      <p:sp>
+        <p:nvSpPr>
+          <p:cNvPr id="12" name="Rectangle 22">
+            <a:extLst>
+              <a:ext uri="{FF2B5EF4-FFF2-40B4-BE49-F238E27FC236}">
+                <a16:creationId xmlns:a16="http://schemas.microsoft.com/office/drawing/2014/main" id="{EE6C18FB-5DE4-F09F-64B9-556EB6D0645D}"/>
+              </a:ext>
+            </a:extLst>
+          </p:cNvPr>
+          <p:cNvSpPr/>
+          <p:nvPr/>
+        </p:nvSpPr>
+        <p:spPr>
+          <a:xfrm>
+            <a:off x="6538445" y="2419310"/>
+            <a:ext cx="771421" cy="279919"/>
+          </a:xfrm>
+          <a:prstGeom prst="rect">
+            <a:avLst/>
+          </a:prstGeom>
+          <a:solidFill>
+            <a:schemeClr val="bg1">
+              <a:lumMod val="95000"/>
+            </a:schemeClr>
+          </a:solidFill>
+          <a:ln w="19050">
+            <a:solidFill>
+              <a:schemeClr val="bg2"/>
+            </a:solidFill>
+          </a:ln>
+        </p:spPr>
+        <p:style>
+          <a:lnRef idx="2">
+            <a:schemeClr val="accent1">
+              <a:shade val="50000"/>
+            </a:schemeClr>
+          </a:lnRef>
+          <a:fillRef idx="1">
+            <a:schemeClr val="accent1"/>
+          </a:fillRef>
+          <a:effectRef idx="0">
+            <a:schemeClr val="accent1"/>
+          </a:effectRef>
+          <a:fontRef idx="minor">
+            <a:schemeClr val="lt1"/>
+          </a:fontRef>
+        </p:style>
+        <p:txBody>
+          <a:bodyPr lIns="0" rIns="0" rtlCol="0" anchor="ctr"/>
+          <a:lstStyle/>
+          <a:p>
+            <a:pPr marL="0" marR="0" lvl="0" indent="0" algn="ctr" defTabSz="914400" rtl="0" eaLnBrk="1" fontAlgn="auto" latinLnBrk="0" hangingPunct="1">
+              <a:lnSpc>
+                <a:spcPct val="100000"/>
+              </a:lnSpc>
+              <a:spcBef>
+                <a:spcPts val="0"/>
+              </a:spcBef>
+              <a:spcAft>
+                <a:spcPts val="0"/>
+              </a:spcAft>
+              <a:buClrTx/>
+              <a:buSzTx/>
+              <a:buFontTx/>
+              <a:buNone/>
+              <a:tabLst/>
+              <a:defRPr/>
+            </a:pPr>
+            <a:r>
+              <a:rPr kumimoji="0" lang="en-US" sz="900" b="0" i="0" u="none" strike="noStrike" kern="1200" cap="none" spc="0" normalizeH="0" baseline="0" noProof="0" dirty="0">
+                <a:ln>
+                  <a:noFill/>
+                </a:ln>
+                <a:solidFill>
+                  <a:prstClr val="black"/>
+                </a:solidFill>
+                <a:effectLst/>
+                <a:uLnTx/>
+                <a:uFillTx/>
+                <a:ea typeface="+mn-ea"/>
+                <a:cs typeface="+mn-cs"/>
+              </a:rPr>
+              <a:t>Data</a:t>
+            </a:r>
+          </a:p>
+        </p:txBody>
+      </p:sp>
+      <p:sp>
+        <p:nvSpPr>
+          <p:cNvPr id="14" name="Rectangle: Rounded Corners 23">
+            <a:extLst>
+              <a:ext uri="{FF2B5EF4-FFF2-40B4-BE49-F238E27FC236}">
+                <a16:creationId xmlns:a16="http://schemas.microsoft.com/office/drawing/2014/main" id="{20F1B40B-9D2A-4055-E8D4-08916EEA285F}"/>
+              </a:ext>
+            </a:extLst>
+          </p:cNvPr>
+          <p:cNvSpPr/>
+          <p:nvPr/>
+        </p:nvSpPr>
+        <p:spPr>
+          <a:xfrm>
+            <a:off x="6538445" y="2179504"/>
+            <a:ext cx="771420" cy="815478"/>
+          </a:xfrm>
+          <a:prstGeom prst="roundRect">
+            <a:avLst/>
+          </a:prstGeom>
+          <a:noFill/>
+          <a:ln w="19050">
+            <a:solidFill>
+              <a:schemeClr val="tx1"/>
+            </a:solidFill>
+          </a:ln>
+        </p:spPr>
+        <p:style>
+          <a:lnRef idx="2">
+            <a:schemeClr val="accent1">
+              <a:shade val="50000"/>
+            </a:schemeClr>
+          </a:lnRef>
+          <a:fillRef idx="1">
+            <a:schemeClr val="accent1"/>
+          </a:fillRef>
+          <a:effectRef idx="0">
+            <a:schemeClr val="accent1"/>
+          </a:effectRef>
+          <a:fontRef idx="minor">
+            <a:schemeClr val="lt1"/>
+          </a:fontRef>
+        </p:style>
+        <p:txBody>
+          <a:bodyPr tIns="0" rtlCol="0" anchor="t" anchorCtr="0"/>
+          <a:lstStyle/>
+          <a:p>
+            <a:pPr marL="0" marR="0" lvl="0" indent="0" algn="l" defTabSz="914400" rtl="0" eaLnBrk="1" fontAlgn="auto" latinLnBrk="0" hangingPunct="1">
+              <a:lnSpc>
+                <a:spcPct val="100000"/>
+              </a:lnSpc>
+              <a:spcBef>
+                <a:spcPts val="0"/>
+              </a:spcBef>
+              <a:spcAft>
+                <a:spcPts val="0"/>
+              </a:spcAft>
+              <a:buClrTx/>
+              <a:buSzTx/>
+              <a:buFontTx/>
+              <a:buNone/>
+              <a:tabLst/>
+              <a:defRPr/>
+            </a:pPr>
+            <a:r>
+              <a:rPr kumimoji="0" lang="en-US" sz="800" b="0" i="0" u="none" strike="noStrike" kern="1200" cap="none" spc="0" normalizeH="0" baseline="0" noProof="0" dirty="0">
+                <a:ln>
+                  <a:noFill/>
+                </a:ln>
+                <a:solidFill>
+                  <a:prstClr val="black"/>
+                </a:solidFill>
+                <a:effectLst/>
+                <a:uLnTx/>
+                <a:uFillTx/>
+                <a:ea typeface="+mn-ea"/>
+                <a:cs typeface="+mn-cs"/>
+              </a:rPr>
+              <a:t>data</a:t>
+            </a:r>
+          </a:p>
+        </p:txBody>
+      </p:sp>
+      <p:sp>
+        <p:nvSpPr>
+          <p:cNvPr id="20" name="Flowchart: Off-page Connector 24">
+            <a:extLst>
+              <a:ext uri="{FF2B5EF4-FFF2-40B4-BE49-F238E27FC236}">
+                <a16:creationId xmlns:a16="http://schemas.microsoft.com/office/drawing/2014/main" id="{164A01C4-D610-9FAD-458C-43DD8228B106}"/>
+              </a:ext>
+            </a:extLst>
+          </p:cNvPr>
+          <p:cNvSpPr/>
+          <p:nvPr/>
+        </p:nvSpPr>
+        <p:spPr>
+          <a:xfrm>
+            <a:off x="6820302" y="2873684"/>
+            <a:ext cx="180000" cy="270000"/>
+          </a:xfrm>
+          <a:prstGeom prst="flowChartOffpageConnector">
+            <a:avLst/>
+          </a:prstGeom>
+          <a:solidFill>
+            <a:schemeClr val="bg1"/>
+          </a:solidFill>
+          <a:ln w="19050">
+            <a:solidFill>
+              <a:schemeClr val="tx1"/>
+            </a:solidFill>
+          </a:ln>
+        </p:spPr>
+        <p:style>
+          <a:lnRef idx="2">
+            <a:schemeClr val="accent1">
+              <a:shade val="50000"/>
+            </a:schemeClr>
+          </a:lnRef>
+          <a:fillRef idx="1">
+            <a:schemeClr val="accent1"/>
+          </a:fillRef>
+          <a:effectRef idx="0">
+            <a:schemeClr val="accent1"/>
+          </a:effectRef>
+          <a:fontRef idx="minor">
+            <a:schemeClr val="lt1"/>
+          </a:fontRef>
+        </p:style>
+        <p:txBody>
+          <a:bodyPr tIns="0" rtlCol="0" anchor="t" anchorCtr="0"/>
+          <a:lstStyle/>
+          <a:p>
+            <a:pPr marL="0" marR="0" lvl="0" indent="0" algn="l" defTabSz="914400" rtl="0" eaLnBrk="1" fontAlgn="auto" latinLnBrk="0" hangingPunct="1">
+              <a:lnSpc>
+                <a:spcPct val="100000"/>
+              </a:lnSpc>
+              <a:spcBef>
+                <a:spcPts val="0"/>
+              </a:spcBef>
+              <a:spcAft>
+                <a:spcPts val="0"/>
+              </a:spcAft>
+              <a:buClrTx/>
+              <a:buSzTx/>
+              <a:buFontTx/>
+              <a:buNone/>
+              <a:tabLst/>
+              <a:defRPr/>
+            </a:pPr>
+            <a:endParaRPr kumimoji="0" lang="en-US" sz="1000" b="0" i="0" u="none" strike="noStrike" kern="1200" cap="none" spc="0" normalizeH="0" baseline="0" noProof="0">
+              <a:ln>
+                <a:noFill/>
+              </a:ln>
+              <a:solidFill>
+                <a:prstClr val="black"/>
+              </a:solidFill>
+              <a:effectLst/>
+              <a:uLnTx/>
+              <a:uFillTx/>
+              <a:ea typeface="+mn-ea"/>
+              <a:cs typeface="+mn-cs"/>
+            </a:endParaRPr>
+          </a:p>
+        </p:txBody>
+      </p:sp>
+      <p:sp>
+        <p:nvSpPr>
+          <p:cNvPr id="4" name="Rectangle 13">
+            <a:extLst>
+              <a:ext uri="{FF2B5EF4-FFF2-40B4-BE49-F238E27FC236}">
+                <a16:creationId xmlns:a16="http://schemas.microsoft.com/office/drawing/2014/main" id="{EC6F8A40-612A-8C3D-7280-288679F9D420}"/>
+              </a:ext>
+            </a:extLst>
+          </p:cNvPr>
+          <p:cNvSpPr/>
+          <p:nvPr/>
+        </p:nvSpPr>
+        <p:spPr>
+          <a:xfrm>
+            <a:off x="4840708" y="3909398"/>
+            <a:ext cx="771421" cy="250978"/>
+          </a:xfrm>
+          <a:prstGeom prst="rect">
+            <a:avLst/>
+          </a:prstGeom>
+          <a:solidFill>
+            <a:schemeClr val="bg1">
+              <a:lumMod val="95000"/>
+            </a:schemeClr>
+          </a:solidFill>
+          <a:ln w="19050">
+            <a:solidFill>
+              <a:schemeClr val="bg2"/>
+            </a:solidFill>
+          </a:ln>
+        </p:spPr>
+        <p:style>
+          <a:lnRef idx="2">
+            <a:schemeClr val="accent1">
+              <a:shade val="50000"/>
+            </a:schemeClr>
+          </a:lnRef>
+          <a:fillRef idx="1">
+            <a:schemeClr val="accent1"/>
+          </a:fillRef>
+          <a:effectRef idx="0">
+            <a:schemeClr val="accent1"/>
+          </a:effectRef>
+          <a:fontRef idx="minor">
+            <a:schemeClr val="lt1"/>
+          </a:fontRef>
+        </p:style>
+        <p:txBody>
+          <a:bodyPr lIns="0" rIns="0" rtlCol="0" anchor="ctr"/>
+          <a:lstStyle/>
+          <a:p>
+            <a:pPr marL="0" marR="0" lvl="0" indent="0" algn="ctr" defTabSz="914400" rtl="0" eaLnBrk="1" fontAlgn="auto" latinLnBrk="0" hangingPunct="1">
+              <a:lnSpc>
+                <a:spcPct val="100000"/>
+              </a:lnSpc>
+              <a:spcBef>
+                <a:spcPts val="0"/>
+              </a:spcBef>
+              <a:spcAft>
+                <a:spcPts val="0"/>
+              </a:spcAft>
+              <a:buClrTx/>
+              <a:buSzTx/>
+              <a:buFontTx/>
+              <a:buNone/>
+              <a:tabLst/>
+              <a:defRPr/>
+            </a:pPr>
+            <a:r>
+              <a:rPr kumimoji="0" lang="en-US" sz="900" b="0" i="0" u="none" strike="noStrike" kern="1200" cap="none" spc="0" normalizeH="0" baseline="0" noProof="0" dirty="0">
+                <a:ln>
+                  <a:noFill/>
+                </a:ln>
+                <a:solidFill>
+                  <a:prstClr val="black"/>
+                </a:solidFill>
+                <a:effectLst/>
+                <a:uLnTx/>
+                <a:uFillTx/>
+                <a:ea typeface="+mn-ea"/>
+                <a:cs typeface="+mn-cs"/>
+              </a:rPr>
+              <a:t>Platform</a:t>
+            </a:r>
+          </a:p>
+        </p:txBody>
+      </p:sp>
+      <p:sp>
+        <p:nvSpPr>
+          <p:cNvPr id="5" name="Rectangle: Rounded Corners 14">
+            <a:extLst>
+              <a:ext uri="{FF2B5EF4-FFF2-40B4-BE49-F238E27FC236}">
+                <a16:creationId xmlns:a16="http://schemas.microsoft.com/office/drawing/2014/main" id="{BF27C827-02C1-A127-65D6-24375404F69F}"/>
+              </a:ext>
+            </a:extLst>
+          </p:cNvPr>
+          <p:cNvSpPr/>
+          <p:nvPr/>
+        </p:nvSpPr>
+        <p:spPr>
+          <a:xfrm>
+            <a:off x="4840708" y="3678572"/>
+            <a:ext cx="771420" cy="815479"/>
+          </a:xfrm>
+          <a:prstGeom prst="roundRect">
+            <a:avLst/>
+          </a:prstGeom>
+          <a:noFill/>
+          <a:ln w="19050">
+            <a:solidFill>
+              <a:schemeClr val="tx1"/>
+            </a:solidFill>
+          </a:ln>
+        </p:spPr>
+        <p:style>
+          <a:lnRef idx="2">
+            <a:schemeClr val="accent1">
+              <a:shade val="50000"/>
+            </a:schemeClr>
+          </a:lnRef>
+          <a:fillRef idx="1">
+            <a:schemeClr val="accent1"/>
+          </a:fillRef>
+          <a:effectRef idx="0">
+            <a:schemeClr val="accent1"/>
+          </a:effectRef>
+          <a:fontRef idx="minor">
+            <a:schemeClr val="lt1"/>
+          </a:fontRef>
+        </p:style>
+        <p:txBody>
+          <a:bodyPr lIns="45720" tIns="0" bIns="73152" rtlCol="0" anchor="b" anchorCtr="0"/>
+          <a:lstStyle/>
+          <a:p>
+            <a:pPr lvl="0">
+              <a:defRPr/>
+            </a:pPr>
+            <a:r>
+              <a:rPr lang="en-US" sz="800" dirty="0">
+                <a:solidFill>
+                  <a:prstClr val="black"/>
+                </a:solidFill>
+              </a:rPr>
+              <a:t>platform</a:t>
+            </a:r>
+            <a:endParaRPr kumimoji="0" lang="en-US" sz="800" b="0" i="0" u="none" strike="noStrike" kern="1200" cap="none" spc="0" normalizeH="0" baseline="0" noProof="0" dirty="0">
+              <a:ln>
+                <a:noFill/>
+              </a:ln>
+              <a:solidFill>
+                <a:prstClr val="black"/>
+              </a:solidFill>
+              <a:effectLst/>
+              <a:uLnTx/>
+              <a:uFillTx/>
+              <a:ea typeface="+mn-ea"/>
+              <a:cs typeface="+mn-cs"/>
+            </a:endParaRPr>
+          </a:p>
+        </p:txBody>
+      </p:sp>
+      <p:sp>
+        <p:nvSpPr>
+          <p:cNvPr id="6" name="Arrow: Chevron 15">
+            <a:extLst>
+              <a:ext uri="{FF2B5EF4-FFF2-40B4-BE49-F238E27FC236}">
+                <a16:creationId xmlns:a16="http://schemas.microsoft.com/office/drawing/2014/main" id="{79746D56-F170-EBDE-66EB-CE5FC42560D9}"/>
+              </a:ext>
+            </a:extLst>
+          </p:cNvPr>
+          <p:cNvSpPr/>
+          <p:nvPr/>
+        </p:nvSpPr>
+        <p:spPr>
+          <a:xfrm rot="5400000">
+            <a:off x="4932922" y="3594198"/>
+            <a:ext cx="270000" cy="180000"/>
+          </a:xfrm>
+          <a:prstGeom prst="chevron">
+            <a:avLst>
+              <a:gd name="adj" fmla="val 14000"/>
+            </a:avLst>
+          </a:prstGeom>
+          <a:solidFill>
+            <a:schemeClr val="bg1"/>
+          </a:solidFill>
+          <a:ln w="12700">
+            <a:solidFill>
+              <a:schemeClr val="tx1"/>
+            </a:solidFill>
+          </a:ln>
+        </p:spPr>
+        <p:style>
+          <a:lnRef idx="2">
+            <a:schemeClr val="accent1">
+              <a:shade val="50000"/>
+            </a:schemeClr>
+          </a:lnRef>
+          <a:fillRef idx="1">
+            <a:schemeClr val="accent1"/>
+          </a:fillRef>
+          <a:effectRef idx="0">
+            <a:schemeClr val="accent1"/>
+          </a:effectRef>
+          <a:fontRef idx="minor">
+            <a:schemeClr val="lt1"/>
+          </a:fontRef>
+        </p:style>
+        <p:txBody>
+          <a:bodyPr tIns="0" rtlCol="0" anchor="t" anchorCtr="0"/>
+          <a:lstStyle/>
+          <a:p>
+            <a:pPr marL="0" marR="0" lvl="0" indent="0" algn="l" defTabSz="914400" rtl="0" eaLnBrk="1" fontAlgn="auto" latinLnBrk="0" hangingPunct="1">
+              <a:lnSpc>
+                <a:spcPct val="100000"/>
+              </a:lnSpc>
+              <a:spcBef>
+                <a:spcPts val="0"/>
+              </a:spcBef>
+              <a:spcAft>
+                <a:spcPts val="0"/>
+              </a:spcAft>
+              <a:buClrTx/>
+              <a:buSzTx/>
+              <a:buFontTx/>
+              <a:buNone/>
+              <a:tabLst/>
+              <a:defRPr/>
+            </a:pPr>
+            <a:endParaRPr kumimoji="0" lang="en-US" sz="1000" b="0" i="0" u="none" strike="noStrike" kern="1200" cap="none" spc="0" normalizeH="0" baseline="0" noProof="0">
+              <a:ln>
+                <a:noFill/>
+              </a:ln>
+              <a:solidFill>
+                <a:prstClr val="black"/>
+              </a:solidFill>
+              <a:effectLst/>
+              <a:uLnTx/>
+              <a:uFillTx/>
+              <a:ea typeface="+mn-ea"/>
+              <a:cs typeface="+mn-cs"/>
+            </a:endParaRPr>
+          </a:p>
+        </p:txBody>
+      </p:sp>
+      <p:sp>
+        <p:nvSpPr>
+          <p:cNvPr id="21" name="Arrow: Chevron 15">
+            <a:extLst>
+              <a:ext uri="{FF2B5EF4-FFF2-40B4-BE49-F238E27FC236}">
+                <a16:creationId xmlns:a16="http://schemas.microsoft.com/office/drawing/2014/main" id="{02DBBB3F-1495-9EDC-6B8D-3CB452135A9E}"/>
+              </a:ext>
+            </a:extLst>
+          </p:cNvPr>
+          <p:cNvSpPr/>
+          <p:nvPr/>
+        </p:nvSpPr>
+        <p:spPr>
+          <a:xfrm rot="5400000">
+            <a:off x="5249914" y="3594198"/>
+            <a:ext cx="270000" cy="180000"/>
+          </a:xfrm>
+          <a:prstGeom prst="chevron">
+            <a:avLst>
+              <a:gd name="adj" fmla="val 14000"/>
+            </a:avLst>
+          </a:prstGeom>
+          <a:solidFill>
+            <a:schemeClr val="bg1"/>
+          </a:solidFill>
+          <a:ln w="12700">
+            <a:solidFill>
+              <a:schemeClr val="tx1"/>
+            </a:solidFill>
+          </a:ln>
+        </p:spPr>
+        <p:style>
+          <a:lnRef idx="2">
+            <a:schemeClr val="accent1">
+              <a:shade val="50000"/>
+            </a:schemeClr>
+          </a:lnRef>
+          <a:fillRef idx="1">
+            <a:schemeClr val="accent1"/>
+          </a:fillRef>
+          <a:effectRef idx="0">
+            <a:schemeClr val="accent1"/>
+          </a:effectRef>
+          <a:fontRef idx="minor">
+            <a:schemeClr val="lt1"/>
+          </a:fontRef>
+        </p:style>
+        <p:txBody>
+          <a:bodyPr tIns="0" rtlCol="0" anchor="t" anchorCtr="0"/>
+          <a:lstStyle/>
+          <a:p>
+            <a:pPr marL="0" marR="0" lvl="0" indent="0" algn="l" defTabSz="914400" rtl="0" eaLnBrk="1" fontAlgn="auto" latinLnBrk="0" hangingPunct="1">
+              <a:lnSpc>
+                <a:spcPct val="100000"/>
+              </a:lnSpc>
+              <a:spcBef>
+                <a:spcPts val="0"/>
+              </a:spcBef>
+              <a:spcAft>
+                <a:spcPts val="0"/>
+              </a:spcAft>
+              <a:buClrTx/>
+              <a:buSzTx/>
+              <a:buFontTx/>
+              <a:buNone/>
+              <a:tabLst/>
+              <a:defRPr/>
+            </a:pPr>
+            <a:endParaRPr kumimoji="0" lang="en-US" sz="1000" b="0" i="0" u="none" strike="noStrike" kern="1200" cap="none" spc="0" normalizeH="0" baseline="0" noProof="0">
+              <a:ln>
+                <a:noFill/>
+              </a:ln>
+              <a:solidFill>
+                <a:prstClr val="black"/>
+              </a:solidFill>
+              <a:effectLst/>
+              <a:uLnTx/>
+              <a:uFillTx/>
+              <a:ea typeface="+mn-ea"/>
+              <a:cs typeface="+mn-cs"/>
+            </a:endParaRPr>
+          </a:p>
+        </p:txBody>
+      </p:sp>
+      <p:cxnSp>
+        <p:nvCxnSpPr>
+          <p:cNvPr id="28" name="Straight Arrow Connector 45">
+            <a:extLst>
+              <a:ext uri="{FF2B5EF4-FFF2-40B4-BE49-F238E27FC236}">
+                <a16:creationId xmlns:a16="http://schemas.microsoft.com/office/drawing/2014/main" id="{4AAE3AF0-0260-759A-C3A9-0D38E2318809}"/>
+              </a:ext>
+            </a:extLst>
+          </p:cNvPr>
+          <p:cNvCxnSpPr>
+            <a:cxnSpLocks/>
+            <a:endCxn id="30" idx="1"/>
+          </p:cNvCxnSpPr>
+          <p:nvPr/>
+        </p:nvCxnSpPr>
+        <p:spPr>
+          <a:xfrm>
+            <a:off x="6910302" y="3143684"/>
+            <a:ext cx="172348" cy="436675"/>
+          </a:xfrm>
+          <a:prstGeom prst="straightConnector1">
+            <a:avLst/>
+          </a:prstGeom>
+          <a:ln w="12700">
+            <a:solidFill>
+              <a:schemeClr val="tx1"/>
+            </a:solidFill>
+            <a:tailEnd type="triangle"/>
+          </a:ln>
+        </p:spPr>
+        <p:style>
+          <a:lnRef idx="1">
+            <a:schemeClr val="accent1"/>
+          </a:lnRef>
+          <a:fillRef idx="0">
+            <a:schemeClr val="accent1"/>
+          </a:fillRef>
+          <a:effectRef idx="0">
+            <a:schemeClr val="accent1"/>
+          </a:effectRef>
+          <a:fontRef idx="minor">
+            <a:schemeClr val="tx1"/>
+          </a:fontRef>
+        </p:style>
+      </p:cxnSp>
+      <p:sp>
+        <p:nvSpPr>
+          <p:cNvPr id="29" name="CasellaDiTesto 28">
+            <a:extLst>
+              <a:ext uri="{FF2B5EF4-FFF2-40B4-BE49-F238E27FC236}">
+                <a16:creationId xmlns:a16="http://schemas.microsoft.com/office/drawing/2014/main" id="{77D45D50-08AA-2C98-A441-6C685F59BB26}"/>
+              </a:ext>
+            </a:extLst>
+          </p:cNvPr>
+          <p:cNvSpPr txBox="1"/>
+          <p:nvPr/>
+        </p:nvSpPr>
+        <p:spPr>
+          <a:xfrm>
+            <a:off x="6528046" y="3262832"/>
+            <a:ext cx="895928" cy="138499"/>
+          </a:xfrm>
+          <a:prstGeom prst="rect">
+            <a:avLst/>
+          </a:prstGeom>
+          <a:solidFill>
+            <a:schemeClr val="bg1"/>
+          </a:solidFill>
+        </p:spPr>
+        <p:txBody>
+          <a:bodyPr wrap="square" lIns="0" tIns="0" rIns="0" bIns="0" rtlCol="0">
+            <a:spAutoFit/>
+          </a:bodyPr>
+          <a:lstStyle>
+            <a:defPPr>
+              <a:defRPr lang="en-US"/>
+            </a:defPPr>
+            <a:lvl1pPr algn="ctr">
+              <a:defRPr sz="900"/>
+            </a:lvl1pPr>
+          </a:lstStyle>
+          <a:p>
+            <a:r>
+              <a:rPr lang="it-IT" dirty="0"/>
+              <a:t>AvailableOn</a:t>
+            </a:r>
+          </a:p>
+        </p:txBody>
+      </p:sp>
+      <p:sp>
+        <p:nvSpPr>
+          <p:cNvPr id="34" name="Flowchart: Off-page Connector 24">
+            <a:extLst>
+              <a:ext uri="{FF2B5EF4-FFF2-40B4-BE49-F238E27FC236}">
+                <a16:creationId xmlns:a16="http://schemas.microsoft.com/office/drawing/2014/main" id="{04A6C246-08EE-C16D-FA4E-6542DE836D4A}"/>
+              </a:ext>
+            </a:extLst>
+          </p:cNvPr>
+          <p:cNvSpPr/>
+          <p:nvPr/>
+        </p:nvSpPr>
+        <p:spPr>
+          <a:xfrm>
+            <a:off x="5555485" y="2413977"/>
+            <a:ext cx="180000" cy="270000"/>
+          </a:xfrm>
+          <a:prstGeom prst="flowChartOffpageConnector">
+            <a:avLst/>
+          </a:prstGeom>
+          <a:solidFill>
+            <a:schemeClr val="bg1"/>
+          </a:solidFill>
+          <a:ln w="19050">
+            <a:solidFill>
+              <a:schemeClr val="tx1"/>
+            </a:solidFill>
+          </a:ln>
+          <a:scene3d>
+            <a:camera prst="orthographicFront">
+              <a:rot lat="0" lon="0" rev="5400000"/>
+            </a:camera>
+            <a:lightRig rig="threePt" dir="t"/>
+          </a:scene3d>
+        </p:spPr>
+        <p:style>
+          <a:lnRef idx="2">
+            <a:schemeClr val="accent1">
+              <a:shade val="50000"/>
+            </a:schemeClr>
+          </a:lnRef>
+          <a:fillRef idx="1">
+            <a:schemeClr val="accent1"/>
+          </a:fillRef>
+          <a:effectRef idx="0">
+            <a:schemeClr val="accent1"/>
+          </a:effectRef>
+          <a:fontRef idx="minor">
+            <a:schemeClr val="lt1"/>
+          </a:fontRef>
+        </p:style>
+        <p:txBody>
+          <a:bodyPr tIns="0" rtlCol="0" anchor="t" anchorCtr="0"/>
+          <a:lstStyle/>
+          <a:p>
+            <a:pPr marL="0" marR="0" lvl="0" indent="0" algn="l" defTabSz="914400" rtl="0" eaLnBrk="1" fontAlgn="auto" latinLnBrk="0" hangingPunct="1">
+              <a:lnSpc>
+                <a:spcPct val="100000"/>
+              </a:lnSpc>
+              <a:spcBef>
+                <a:spcPts val="0"/>
+              </a:spcBef>
+              <a:spcAft>
+                <a:spcPts val="0"/>
+              </a:spcAft>
+              <a:buClrTx/>
+              <a:buSzTx/>
+              <a:buFontTx/>
+              <a:buNone/>
+              <a:tabLst/>
+              <a:defRPr/>
+            </a:pPr>
+            <a:endParaRPr kumimoji="0" lang="en-US" sz="1000" b="0" i="0" u="none" strike="noStrike" kern="1200" cap="none" spc="0" normalizeH="0" baseline="0" noProof="0">
+              <a:ln>
+                <a:noFill/>
+              </a:ln>
+              <a:solidFill>
+                <a:prstClr val="black"/>
+              </a:solidFill>
+              <a:effectLst/>
+              <a:uLnTx/>
+              <a:uFillTx/>
+              <a:ea typeface="+mn-ea"/>
+              <a:cs typeface="+mn-cs"/>
+            </a:endParaRPr>
+          </a:p>
+        </p:txBody>
+      </p:sp>
+      <p:sp>
+        <p:nvSpPr>
+          <p:cNvPr id="36" name="Arrow: Chevron 15">
+            <a:extLst>
+              <a:ext uri="{FF2B5EF4-FFF2-40B4-BE49-F238E27FC236}">
+                <a16:creationId xmlns:a16="http://schemas.microsoft.com/office/drawing/2014/main" id="{ED84C81D-6FDE-0C27-79E1-95FD83B7F868}"/>
+              </a:ext>
+            </a:extLst>
+          </p:cNvPr>
+          <p:cNvSpPr/>
+          <p:nvPr/>
+        </p:nvSpPr>
+        <p:spPr>
+          <a:xfrm rot="5400000">
+            <a:off x="6401738" y="2467639"/>
+            <a:ext cx="270000" cy="180000"/>
+          </a:xfrm>
+          <a:prstGeom prst="chevron">
+            <a:avLst>
+              <a:gd name="adj" fmla="val 14000"/>
+            </a:avLst>
+          </a:prstGeom>
+          <a:solidFill>
+            <a:schemeClr val="bg1"/>
+          </a:solidFill>
+          <a:ln w="12700">
+            <a:solidFill>
+              <a:schemeClr val="tx1"/>
+            </a:solidFill>
+          </a:ln>
+          <a:scene3d>
+            <a:camera prst="orthographicFront">
+              <a:rot lat="0" lon="0" rev="5400000"/>
+            </a:camera>
+            <a:lightRig rig="threePt" dir="t"/>
+          </a:scene3d>
+        </p:spPr>
+        <p:style>
+          <a:lnRef idx="2">
+            <a:schemeClr val="accent1">
+              <a:shade val="50000"/>
+            </a:schemeClr>
+          </a:lnRef>
+          <a:fillRef idx="1">
+            <a:schemeClr val="accent1"/>
+          </a:fillRef>
+          <a:effectRef idx="0">
+            <a:schemeClr val="accent1"/>
+          </a:effectRef>
+          <a:fontRef idx="minor">
+            <a:schemeClr val="lt1"/>
+          </a:fontRef>
+        </p:style>
+        <p:txBody>
+          <a:bodyPr tIns="0" rtlCol="0" anchor="t" anchorCtr="0"/>
+          <a:lstStyle/>
+          <a:p>
+            <a:pPr marL="0" marR="0" lvl="0" indent="0" algn="l" defTabSz="914400" rtl="0" eaLnBrk="1" fontAlgn="auto" latinLnBrk="0" hangingPunct="1">
+              <a:lnSpc>
+                <a:spcPct val="100000"/>
+              </a:lnSpc>
+              <a:spcBef>
+                <a:spcPts val="0"/>
+              </a:spcBef>
+              <a:spcAft>
+                <a:spcPts val="0"/>
+              </a:spcAft>
+              <a:buClrTx/>
+              <a:buSzTx/>
+              <a:buFontTx/>
+              <a:buNone/>
+              <a:tabLst/>
+              <a:defRPr/>
+            </a:pPr>
+            <a:endParaRPr kumimoji="0" lang="en-US" sz="1000" b="0" i="0" u="none" strike="noStrike" kern="1200" cap="none" spc="0" normalizeH="0" baseline="0" noProof="0">
+              <a:ln>
+                <a:noFill/>
+              </a:ln>
+              <a:solidFill>
+                <a:prstClr val="black"/>
+              </a:solidFill>
+              <a:effectLst/>
+              <a:uLnTx/>
+              <a:uFillTx/>
+              <a:ea typeface="+mn-ea"/>
+              <a:cs typeface="+mn-cs"/>
+            </a:endParaRPr>
+          </a:p>
+        </p:txBody>
+      </p:sp>
+      <p:cxnSp>
+        <p:nvCxnSpPr>
+          <p:cNvPr id="37" name="Straight Arrow Connector 45">
+            <a:extLst>
+              <a:ext uri="{FF2B5EF4-FFF2-40B4-BE49-F238E27FC236}">
+                <a16:creationId xmlns:a16="http://schemas.microsoft.com/office/drawing/2014/main" id="{FBC655D1-2A58-E33E-3355-B41C63787C39}"/>
+              </a:ext>
+            </a:extLst>
+          </p:cNvPr>
+          <p:cNvCxnSpPr>
+            <a:cxnSpLocks/>
+            <a:stCxn id="34" idx="3"/>
+            <a:endCxn id="36" idx="2"/>
+          </p:cNvCxnSpPr>
+          <p:nvPr/>
+        </p:nvCxnSpPr>
+        <p:spPr>
+          <a:xfrm flipV="1">
+            <a:off x="5735485" y="2545039"/>
+            <a:ext cx="711253" cy="3938"/>
+          </a:xfrm>
+          <a:prstGeom prst="straightConnector1">
+            <a:avLst/>
+          </a:prstGeom>
+          <a:ln w="12700">
+            <a:solidFill>
+              <a:schemeClr val="tx1"/>
+            </a:solidFill>
+            <a:tailEnd type="triangle"/>
+          </a:ln>
+        </p:spPr>
+        <p:style>
+          <a:lnRef idx="1">
+            <a:schemeClr val="accent1"/>
+          </a:lnRef>
+          <a:fillRef idx="0">
+            <a:schemeClr val="accent1"/>
+          </a:fillRef>
+          <a:effectRef idx="0">
+            <a:schemeClr val="accent1"/>
+          </a:effectRef>
+          <a:fontRef idx="minor">
+            <a:schemeClr val="tx1"/>
+          </a:fontRef>
+        </p:style>
+      </p:cxnSp>
+      <p:sp>
+        <p:nvSpPr>
+          <p:cNvPr id="40" name="CasellaDiTesto 39">
+            <a:extLst>
+              <a:ext uri="{FF2B5EF4-FFF2-40B4-BE49-F238E27FC236}">
+                <a16:creationId xmlns:a16="http://schemas.microsoft.com/office/drawing/2014/main" id="{80CE7F98-5859-A1AF-3743-631A9E7B62CB}"/>
+              </a:ext>
+            </a:extLst>
+          </p:cNvPr>
+          <p:cNvSpPr txBox="1"/>
+          <p:nvPr/>
+        </p:nvSpPr>
+        <p:spPr>
+          <a:xfrm>
+            <a:off x="5618267" y="2316108"/>
+            <a:ext cx="895928" cy="230832"/>
+          </a:xfrm>
+          <a:prstGeom prst="rect">
+            <a:avLst/>
+          </a:prstGeom>
+          <a:noFill/>
+        </p:spPr>
+        <p:txBody>
+          <a:bodyPr wrap="square" rtlCol="0">
+            <a:spAutoFit/>
+          </a:bodyPr>
+          <a:lstStyle/>
+          <a:p>
+            <a:pPr algn="ctr"/>
+            <a:r>
+              <a:rPr lang="it-IT" sz="900" dirty="0" err="1"/>
+              <a:t>Processes</a:t>
+            </a:r>
+            <a:endParaRPr lang="it-IT" sz="900" dirty="0"/>
+          </a:p>
+        </p:txBody>
+      </p:sp>
+      <p:sp>
+        <p:nvSpPr>
+          <p:cNvPr id="45" name="Rectangle: Rounded Corners 63">
+            <a:extLst>
+              <a:ext uri="{FF2B5EF4-FFF2-40B4-BE49-F238E27FC236}">
+                <a16:creationId xmlns:a16="http://schemas.microsoft.com/office/drawing/2014/main" id="{3EDE72A7-1A7D-6DF5-90D3-42D43F301BDF}"/>
+              </a:ext>
+            </a:extLst>
+          </p:cNvPr>
+          <p:cNvSpPr/>
+          <p:nvPr/>
+        </p:nvSpPr>
+        <p:spPr>
+          <a:xfrm>
+            <a:off x="7165531" y="424687"/>
+            <a:ext cx="1545903" cy="1083735"/>
+          </a:xfrm>
+          <a:prstGeom prst="roundRect">
+            <a:avLst/>
+          </a:prstGeom>
+          <a:noFill/>
+          <a:ln w="19050">
+            <a:prstDash val="sysDash"/>
+          </a:ln>
+        </p:spPr>
+        <p:style>
+          <a:lnRef idx="2">
+            <a:schemeClr val="accent1">
+              <a:shade val="15000"/>
+            </a:schemeClr>
+          </a:lnRef>
+          <a:fillRef idx="1">
+            <a:schemeClr val="accent1"/>
+          </a:fillRef>
+          <a:effectRef idx="0">
+            <a:schemeClr val="accent1"/>
+          </a:effectRef>
+          <a:fontRef idx="minor">
+            <a:schemeClr val="lt1"/>
+          </a:fontRef>
+        </p:style>
+        <p:txBody>
+          <a:bodyPr rtlCol="0" anchor="ctr" anchorCtr="0"/>
+          <a:lstStyle/>
+          <a:p>
+            <a:pPr algn="ctr"/>
+            <a:r>
+              <a:rPr lang="en-US" sz="1100" dirty="0">
+                <a:solidFill>
+                  <a:schemeClr val="tx1"/>
+                </a:solidFill>
+              </a:rPr>
+              <a:t>Substituting</a:t>
+            </a:r>
+            <a:br>
+              <a:rPr lang="en-US" sz="1100" dirty="0">
+                <a:solidFill>
+                  <a:schemeClr val="tx1"/>
+                </a:solidFill>
+              </a:rPr>
+            </a:br>
+            <a:r>
+              <a:rPr lang="en-US" sz="1100" dirty="0">
+                <a:solidFill>
+                  <a:schemeClr val="tx1"/>
+                </a:solidFill>
+              </a:rPr>
+              <a:t>Service Template</a:t>
+            </a:r>
+            <a:br>
+              <a:rPr lang="en-US" sz="1100" dirty="0">
+                <a:solidFill>
+                  <a:schemeClr val="tx1"/>
+                </a:solidFill>
+              </a:rPr>
+            </a:br>
+            <a:r>
+              <a:rPr lang="en-US" sz="1100" dirty="0">
+                <a:solidFill>
+                  <a:schemeClr val="tx1"/>
+                </a:solidFill>
+              </a:rPr>
+              <a:t>(Data)</a:t>
+            </a:r>
+          </a:p>
+        </p:txBody>
+      </p:sp>
+      <p:cxnSp>
+        <p:nvCxnSpPr>
+          <p:cNvPr id="46" name="Straight Arrow Connector 134">
+            <a:extLst>
+              <a:ext uri="{FF2B5EF4-FFF2-40B4-BE49-F238E27FC236}">
+                <a16:creationId xmlns:a16="http://schemas.microsoft.com/office/drawing/2014/main" id="{EDD9321E-B335-92D9-C1FD-9BA1158AF77F}"/>
+              </a:ext>
+            </a:extLst>
+          </p:cNvPr>
+          <p:cNvCxnSpPr>
+            <a:cxnSpLocks/>
+            <a:stCxn id="14" idx="0"/>
+            <a:endCxn id="45" idx="2"/>
+          </p:cNvCxnSpPr>
+          <p:nvPr/>
+        </p:nvCxnSpPr>
+        <p:spPr>
+          <a:xfrm flipV="1">
+            <a:off x="6924155" y="1508422"/>
+            <a:ext cx="1014328" cy="671082"/>
+          </a:xfrm>
+          <a:prstGeom prst="straightConnector1">
+            <a:avLst/>
+          </a:prstGeom>
+          <a:ln w="28575">
+            <a:solidFill>
+              <a:schemeClr val="accent2"/>
+            </a:solidFill>
+            <a:prstDash val="sysDash"/>
+            <a:headEnd type="triangle" w="med" len="med"/>
+            <a:tailEnd type="none" w="med" len="med"/>
+          </a:ln>
+        </p:spPr>
+        <p:style>
+          <a:lnRef idx="1">
+            <a:schemeClr val="accent1"/>
+          </a:lnRef>
+          <a:fillRef idx="0">
+            <a:schemeClr val="accent1"/>
+          </a:fillRef>
+          <a:effectRef idx="0">
+            <a:schemeClr val="accent1"/>
+          </a:effectRef>
+          <a:fontRef idx="minor">
+            <a:schemeClr val="tx1"/>
+          </a:fontRef>
+        </p:style>
+      </p:cxnSp>
+      <p:sp>
+        <p:nvSpPr>
+          <p:cNvPr id="47" name="TextBox 135">
+            <a:extLst>
+              <a:ext uri="{FF2B5EF4-FFF2-40B4-BE49-F238E27FC236}">
+                <a16:creationId xmlns:a16="http://schemas.microsoft.com/office/drawing/2014/main" id="{05FA54AE-04FA-BB68-8ADD-F976EEE191D3}"/>
+              </a:ext>
+            </a:extLst>
+          </p:cNvPr>
+          <p:cNvSpPr txBox="1"/>
+          <p:nvPr/>
+        </p:nvSpPr>
+        <p:spPr>
+          <a:xfrm>
+            <a:off x="7696519" y="1719295"/>
+            <a:ext cx="533800" cy="138499"/>
+          </a:xfrm>
+          <a:prstGeom prst="rect">
+            <a:avLst/>
+          </a:prstGeom>
+          <a:solidFill>
+            <a:schemeClr val="bg1"/>
+          </a:solidFill>
+        </p:spPr>
+        <p:txBody>
+          <a:bodyPr wrap="square" lIns="0" tIns="0" rIns="0" bIns="0" rtlCol="0">
+            <a:spAutoFit/>
+          </a:bodyPr>
+          <a:lstStyle/>
+          <a:p>
+            <a:pPr algn="ctr"/>
+            <a:r>
+              <a:rPr lang="en-US" sz="900" b="1" dirty="0"/>
+              <a:t>substitutes</a:t>
+            </a:r>
+          </a:p>
+        </p:txBody>
+      </p:sp>
+      <p:sp>
+        <p:nvSpPr>
+          <p:cNvPr id="50" name="Flowchart: Multidocument 1">
+            <a:extLst>
+              <a:ext uri="{FF2B5EF4-FFF2-40B4-BE49-F238E27FC236}">
+                <a16:creationId xmlns:a16="http://schemas.microsoft.com/office/drawing/2014/main" id="{B5CAAE1D-B3D9-1B31-A3BB-57C4707BAC8F}"/>
+              </a:ext>
+            </a:extLst>
+          </p:cNvPr>
+          <p:cNvSpPr/>
+          <p:nvPr/>
+        </p:nvSpPr>
+        <p:spPr>
+          <a:xfrm>
+            <a:off x="2821407" y="1578702"/>
+            <a:ext cx="1021210" cy="685800"/>
+          </a:xfrm>
+          <a:prstGeom prst="flowChartMultidocument">
+            <a:avLst/>
+          </a:prstGeom>
+          <a:noFill/>
+          <a:ln w="19050" cap="flat" cmpd="sng" algn="ctr">
+            <a:solidFill>
+              <a:sysClr val="windowText" lastClr="000000"/>
+            </a:solidFill>
+            <a:prstDash val="solid"/>
+          </a:ln>
+          <a:effectLst/>
+        </p:spPr>
+        <p:txBody>
+          <a:bodyPr tIns="91440" rtlCol="0" anchor="t" anchorCtr="0"/>
+          <a:lstStyle/>
+          <a:p>
+            <a:r>
+              <a:rPr lang="en-US" sz="1100" kern="0" dirty="0">
+                <a:solidFill>
+                  <a:prstClr val="black"/>
+                </a:solidFill>
+                <a:latin typeface="Calibri" panose="020F0502020204030204"/>
+              </a:rPr>
+              <a:t>Application Profile</a:t>
+            </a:r>
+          </a:p>
+        </p:txBody>
+      </p:sp>
+      <p:sp>
+        <p:nvSpPr>
+          <p:cNvPr id="51" name="Flowchart: Multidocument 1">
+            <a:extLst>
+              <a:ext uri="{FF2B5EF4-FFF2-40B4-BE49-F238E27FC236}">
+                <a16:creationId xmlns:a16="http://schemas.microsoft.com/office/drawing/2014/main" id="{303E83EF-38B8-6935-EB7F-DB1C80F80D88}"/>
+              </a:ext>
+            </a:extLst>
+          </p:cNvPr>
+          <p:cNvSpPr/>
+          <p:nvPr/>
+        </p:nvSpPr>
+        <p:spPr>
+          <a:xfrm>
+            <a:off x="2195893" y="4081166"/>
+            <a:ext cx="1021210" cy="685800"/>
+          </a:xfrm>
+          <a:prstGeom prst="flowChartMultidocument">
+            <a:avLst/>
+          </a:prstGeom>
+          <a:noFill/>
+          <a:ln w="19050" cap="flat" cmpd="sng" algn="ctr">
+            <a:solidFill>
+              <a:sysClr val="windowText" lastClr="000000"/>
+            </a:solidFill>
+            <a:prstDash val="solid"/>
+          </a:ln>
+          <a:effectLst/>
+        </p:spPr>
+        <p:txBody>
+          <a:bodyPr tIns="91440" rtlCol="0" anchor="t" anchorCtr="0"/>
+          <a:lstStyle/>
+          <a:p>
+            <a:r>
+              <a:rPr lang="en-US" sz="1100" kern="0" dirty="0">
+                <a:solidFill>
+                  <a:prstClr val="black"/>
+                </a:solidFill>
+                <a:latin typeface="Calibri" panose="020F0502020204030204"/>
+              </a:rPr>
+              <a:t>Platform</a:t>
+            </a:r>
+            <a:br>
+              <a:rPr lang="en-US" sz="1100" kern="0" dirty="0">
+                <a:solidFill>
+                  <a:prstClr val="black"/>
+                </a:solidFill>
+                <a:latin typeface="Calibri" panose="020F0502020204030204"/>
+              </a:rPr>
+            </a:br>
+            <a:r>
+              <a:rPr lang="en-US" sz="1100" kern="0" dirty="0">
+                <a:solidFill>
+                  <a:prstClr val="black"/>
+                </a:solidFill>
+                <a:latin typeface="Calibri" panose="020F0502020204030204"/>
+              </a:rPr>
+              <a:t>Profile</a:t>
+            </a:r>
+          </a:p>
+        </p:txBody>
+      </p:sp>
+      <p:sp>
+        <p:nvSpPr>
+          <p:cNvPr id="52" name="Flowchart: Multidocument 1">
+            <a:extLst>
+              <a:ext uri="{FF2B5EF4-FFF2-40B4-BE49-F238E27FC236}">
+                <a16:creationId xmlns:a16="http://schemas.microsoft.com/office/drawing/2014/main" id="{A960590E-F368-AD20-9A75-0E22FAA82B3D}"/>
+              </a:ext>
+            </a:extLst>
+          </p:cNvPr>
+          <p:cNvSpPr/>
+          <p:nvPr/>
+        </p:nvSpPr>
+        <p:spPr>
+          <a:xfrm>
+            <a:off x="3383662" y="2717800"/>
+            <a:ext cx="1021210" cy="685800"/>
+          </a:xfrm>
+          <a:prstGeom prst="flowChartMultidocument">
+            <a:avLst/>
+          </a:prstGeom>
+          <a:noFill/>
+          <a:ln w="19050" cap="flat" cmpd="sng" algn="ctr">
+            <a:solidFill>
+              <a:sysClr val="windowText" lastClr="000000"/>
+            </a:solidFill>
+            <a:prstDash val="solid"/>
+          </a:ln>
+          <a:effectLst/>
+        </p:spPr>
+        <p:txBody>
+          <a:bodyPr tIns="91440" rtlCol="0" anchor="t" anchorCtr="0"/>
+          <a:lstStyle/>
+          <a:p>
+            <a:r>
+              <a:rPr lang="en-US" sz="1100" kern="0" dirty="0">
+                <a:solidFill>
+                  <a:prstClr val="black"/>
+                </a:solidFill>
+                <a:latin typeface="Calibri" panose="020F0502020204030204"/>
+              </a:rPr>
+              <a:t>Common Profile</a:t>
+            </a:r>
+          </a:p>
+        </p:txBody>
+      </p:sp>
+      <p:sp>
+        <p:nvSpPr>
+          <p:cNvPr id="53" name="Flowchart: Multidocument 1">
+            <a:extLst>
+              <a:ext uri="{FF2B5EF4-FFF2-40B4-BE49-F238E27FC236}">
+                <a16:creationId xmlns:a16="http://schemas.microsoft.com/office/drawing/2014/main" id="{EDB4CE4C-FF80-E710-01D0-B54CE5D9F13E}"/>
+              </a:ext>
+            </a:extLst>
+          </p:cNvPr>
+          <p:cNvSpPr/>
+          <p:nvPr/>
+        </p:nvSpPr>
+        <p:spPr>
+          <a:xfrm>
+            <a:off x="8349384" y="1578702"/>
+            <a:ext cx="1021210" cy="685800"/>
+          </a:xfrm>
+          <a:prstGeom prst="flowChartMultidocument">
+            <a:avLst/>
+          </a:prstGeom>
+          <a:noFill/>
+          <a:ln w="19050" cap="flat" cmpd="sng" algn="ctr">
+            <a:solidFill>
+              <a:sysClr val="windowText" lastClr="000000"/>
+            </a:solidFill>
+            <a:prstDash val="solid"/>
+          </a:ln>
+          <a:effectLst/>
+        </p:spPr>
+        <p:txBody>
+          <a:bodyPr tIns="91440" rtlCol="0" anchor="t" anchorCtr="0"/>
+          <a:lstStyle/>
+          <a:p>
+            <a:r>
+              <a:rPr lang="en-US" sz="1100" kern="0" dirty="0">
+                <a:solidFill>
+                  <a:prstClr val="black"/>
+                </a:solidFill>
+                <a:latin typeface="Calibri" panose="020F0502020204030204"/>
+              </a:rPr>
+              <a:t>Data Profile</a:t>
+            </a:r>
+          </a:p>
+        </p:txBody>
+      </p:sp>
+      <p:sp>
+        <p:nvSpPr>
+          <p:cNvPr id="22" name="Rectangle 13">
+            <a:extLst>
+              <a:ext uri="{FF2B5EF4-FFF2-40B4-BE49-F238E27FC236}">
+                <a16:creationId xmlns:a16="http://schemas.microsoft.com/office/drawing/2014/main" id="{9E62FE42-FC37-3246-4B58-76BA904E763A}"/>
+              </a:ext>
+            </a:extLst>
+          </p:cNvPr>
+          <p:cNvSpPr/>
+          <p:nvPr/>
+        </p:nvSpPr>
+        <p:spPr>
+          <a:xfrm>
+            <a:off x="6538444" y="3915359"/>
+            <a:ext cx="771421" cy="250978"/>
+          </a:xfrm>
+          <a:prstGeom prst="rect">
+            <a:avLst/>
+          </a:prstGeom>
+          <a:solidFill>
+            <a:schemeClr val="bg1">
+              <a:lumMod val="95000"/>
+            </a:schemeClr>
+          </a:solidFill>
+          <a:ln w="19050">
+            <a:solidFill>
+              <a:schemeClr val="bg2"/>
+            </a:solidFill>
+          </a:ln>
+        </p:spPr>
+        <p:style>
+          <a:lnRef idx="2">
+            <a:schemeClr val="accent1">
+              <a:shade val="50000"/>
+            </a:schemeClr>
+          </a:lnRef>
+          <a:fillRef idx="1">
+            <a:schemeClr val="accent1"/>
+          </a:fillRef>
+          <a:effectRef idx="0">
+            <a:schemeClr val="accent1"/>
+          </a:effectRef>
+          <a:fontRef idx="minor">
+            <a:schemeClr val="lt1"/>
+          </a:fontRef>
+        </p:style>
+        <p:txBody>
+          <a:bodyPr lIns="0" rIns="0" rtlCol="0" anchor="ctr"/>
+          <a:lstStyle/>
+          <a:p>
+            <a:pPr marL="0" marR="0" lvl="0" indent="0" algn="ctr" defTabSz="914400" rtl="0" eaLnBrk="1" fontAlgn="auto" latinLnBrk="0" hangingPunct="1">
+              <a:lnSpc>
+                <a:spcPct val="100000"/>
+              </a:lnSpc>
+              <a:spcBef>
+                <a:spcPts val="0"/>
+              </a:spcBef>
+              <a:spcAft>
+                <a:spcPts val="0"/>
+              </a:spcAft>
+              <a:buClrTx/>
+              <a:buSzTx/>
+              <a:buFontTx/>
+              <a:buNone/>
+              <a:tabLst/>
+              <a:defRPr/>
+            </a:pPr>
+            <a:r>
+              <a:rPr kumimoji="0" lang="en-US" sz="900" b="0" i="0" u="none" strike="noStrike" kern="1200" cap="none" spc="0" normalizeH="0" baseline="0" noProof="0" dirty="0">
+                <a:ln>
+                  <a:noFill/>
+                </a:ln>
+                <a:solidFill>
+                  <a:prstClr val="black"/>
+                </a:solidFill>
+                <a:effectLst/>
+                <a:uLnTx/>
+                <a:uFillTx/>
+                <a:ea typeface="+mn-ea"/>
+                <a:cs typeface="+mn-cs"/>
+              </a:rPr>
+              <a:t>Platform</a:t>
+            </a:r>
+          </a:p>
+        </p:txBody>
+      </p:sp>
+      <p:sp>
+        <p:nvSpPr>
+          <p:cNvPr id="25" name="Rectangle: Rounded Corners 14">
+            <a:extLst>
+              <a:ext uri="{FF2B5EF4-FFF2-40B4-BE49-F238E27FC236}">
+                <a16:creationId xmlns:a16="http://schemas.microsoft.com/office/drawing/2014/main" id="{853EF04B-1D2C-4EE0-974F-3B40A9642D5F}"/>
+              </a:ext>
+            </a:extLst>
+          </p:cNvPr>
+          <p:cNvSpPr/>
+          <p:nvPr/>
+        </p:nvSpPr>
+        <p:spPr>
+          <a:xfrm>
+            <a:off x="6538444" y="3684533"/>
+            <a:ext cx="771420" cy="815479"/>
+          </a:xfrm>
+          <a:prstGeom prst="roundRect">
+            <a:avLst/>
+          </a:prstGeom>
+          <a:noFill/>
+          <a:ln w="19050">
+            <a:solidFill>
+              <a:schemeClr val="tx1"/>
+            </a:solidFill>
+          </a:ln>
+        </p:spPr>
+        <p:style>
+          <a:lnRef idx="2">
+            <a:schemeClr val="accent1">
+              <a:shade val="50000"/>
+            </a:schemeClr>
+          </a:lnRef>
+          <a:fillRef idx="1">
+            <a:schemeClr val="accent1"/>
+          </a:fillRef>
+          <a:effectRef idx="0">
+            <a:schemeClr val="accent1"/>
+          </a:effectRef>
+          <a:fontRef idx="minor">
+            <a:schemeClr val="lt1"/>
+          </a:fontRef>
+        </p:style>
+        <p:txBody>
+          <a:bodyPr lIns="45720" tIns="0" bIns="73152" rtlCol="0" anchor="b" anchorCtr="0"/>
+          <a:lstStyle/>
+          <a:p>
+            <a:r>
+              <a:rPr lang="en-US" sz="800" dirty="0">
+                <a:solidFill>
+                  <a:prstClr val="black"/>
+                </a:solidFill>
+              </a:rPr>
+              <a:t>platform</a:t>
+            </a:r>
+          </a:p>
+        </p:txBody>
+      </p:sp>
+      <p:sp>
+        <p:nvSpPr>
+          <p:cNvPr id="26" name="Arrow: Chevron 15">
+            <a:extLst>
+              <a:ext uri="{FF2B5EF4-FFF2-40B4-BE49-F238E27FC236}">
+                <a16:creationId xmlns:a16="http://schemas.microsoft.com/office/drawing/2014/main" id="{BB8852C4-2BA0-C328-88D8-AEC3B3B556AA}"/>
+              </a:ext>
+            </a:extLst>
+          </p:cNvPr>
+          <p:cNvSpPr/>
+          <p:nvPr/>
+        </p:nvSpPr>
+        <p:spPr>
+          <a:xfrm rot="5400000">
+            <a:off x="6630658" y="3600159"/>
+            <a:ext cx="270000" cy="180000"/>
+          </a:xfrm>
+          <a:prstGeom prst="chevron">
+            <a:avLst>
+              <a:gd name="adj" fmla="val 14000"/>
+            </a:avLst>
+          </a:prstGeom>
+          <a:solidFill>
+            <a:schemeClr val="bg1"/>
+          </a:solidFill>
+          <a:ln w="12700">
+            <a:solidFill>
+              <a:schemeClr val="tx1"/>
+            </a:solidFill>
+          </a:ln>
+        </p:spPr>
+        <p:style>
+          <a:lnRef idx="2">
+            <a:schemeClr val="accent1">
+              <a:shade val="50000"/>
+            </a:schemeClr>
+          </a:lnRef>
+          <a:fillRef idx="1">
+            <a:schemeClr val="accent1"/>
+          </a:fillRef>
+          <a:effectRef idx="0">
+            <a:schemeClr val="accent1"/>
+          </a:effectRef>
+          <a:fontRef idx="minor">
+            <a:schemeClr val="lt1"/>
+          </a:fontRef>
+        </p:style>
+        <p:txBody>
+          <a:bodyPr tIns="0" rtlCol="0" anchor="t" anchorCtr="0"/>
+          <a:lstStyle/>
+          <a:p>
+            <a:pPr marL="0" marR="0" lvl="0" indent="0" algn="l" defTabSz="914400" rtl="0" eaLnBrk="1" fontAlgn="auto" latinLnBrk="0" hangingPunct="1">
+              <a:lnSpc>
+                <a:spcPct val="100000"/>
+              </a:lnSpc>
+              <a:spcBef>
+                <a:spcPts val="0"/>
+              </a:spcBef>
+              <a:spcAft>
+                <a:spcPts val="0"/>
+              </a:spcAft>
+              <a:buClrTx/>
+              <a:buSzTx/>
+              <a:buFontTx/>
+              <a:buNone/>
+              <a:tabLst/>
+              <a:defRPr/>
+            </a:pPr>
+            <a:endParaRPr kumimoji="0" lang="en-US" sz="1000" b="0" i="0" u="none" strike="noStrike" kern="1200" cap="none" spc="0" normalizeH="0" baseline="0" noProof="0">
+              <a:ln>
+                <a:noFill/>
+              </a:ln>
+              <a:solidFill>
+                <a:prstClr val="black"/>
+              </a:solidFill>
+              <a:effectLst/>
+              <a:uLnTx/>
+              <a:uFillTx/>
+              <a:ea typeface="+mn-ea"/>
+              <a:cs typeface="+mn-cs"/>
+            </a:endParaRPr>
+          </a:p>
+        </p:txBody>
+      </p:sp>
+      <p:sp>
+        <p:nvSpPr>
+          <p:cNvPr id="30" name="Arrow: Chevron 15">
+            <a:extLst>
+              <a:ext uri="{FF2B5EF4-FFF2-40B4-BE49-F238E27FC236}">
+                <a16:creationId xmlns:a16="http://schemas.microsoft.com/office/drawing/2014/main" id="{A60663FB-1B2B-56B2-E512-913A4EC8F8FE}"/>
+              </a:ext>
+            </a:extLst>
+          </p:cNvPr>
+          <p:cNvSpPr/>
+          <p:nvPr/>
+        </p:nvSpPr>
+        <p:spPr>
+          <a:xfrm rot="5400000">
+            <a:off x="6947650" y="3600159"/>
+            <a:ext cx="270000" cy="180000"/>
+          </a:xfrm>
+          <a:prstGeom prst="chevron">
+            <a:avLst>
+              <a:gd name="adj" fmla="val 14000"/>
+            </a:avLst>
+          </a:prstGeom>
+          <a:solidFill>
+            <a:schemeClr val="bg1"/>
+          </a:solidFill>
+          <a:ln w="12700">
+            <a:solidFill>
+              <a:schemeClr val="tx1"/>
+            </a:solidFill>
+          </a:ln>
+        </p:spPr>
+        <p:style>
+          <a:lnRef idx="2">
+            <a:schemeClr val="accent1">
+              <a:shade val="50000"/>
+            </a:schemeClr>
+          </a:lnRef>
+          <a:fillRef idx="1">
+            <a:schemeClr val="accent1"/>
+          </a:fillRef>
+          <a:effectRef idx="0">
+            <a:schemeClr val="accent1"/>
+          </a:effectRef>
+          <a:fontRef idx="minor">
+            <a:schemeClr val="lt1"/>
+          </a:fontRef>
+        </p:style>
+        <p:txBody>
+          <a:bodyPr tIns="0" rtlCol="0" anchor="t" anchorCtr="0"/>
+          <a:lstStyle/>
+          <a:p>
+            <a:pPr marL="0" marR="0" lvl="0" indent="0" algn="l" defTabSz="914400" rtl="0" eaLnBrk="1" fontAlgn="auto" latinLnBrk="0" hangingPunct="1">
+              <a:lnSpc>
+                <a:spcPct val="100000"/>
+              </a:lnSpc>
+              <a:spcBef>
+                <a:spcPts val="0"/>
+              </a:spcBef>
+              <a:spcAft>
+                <a:spcPts val="0"/>
+              </a:spcAft>
+              <a:buClrTx/>
+              <a:buSzTx/>
+              <a:buFontTx/>
+              <a:buNone/>
+              <a:tabLst/>
+              <a:defRPr/>
+            </a:pPr>
+            <a:endParaRPr kumimoji="0" lang="en-US" sz="1000" b="0" i="0" u="none" strike="noStrike" kern="1200" cap="none" spc="0" normalizeH="0" baseline="0" noProof="0">
+              <a:ln>
+                <a:noFill/>
+              </a:ln>
+              <a:solidFill>
+                <a:prstClr val="black"/>
+              </a:solidFill>
+              <a:effectLst/>
+              <a:uLnTx/>
+              <a:uFillTx/>
+              <a:ea typeface="+mn-ea"/>
+              <a:cs typeface="+mn-cs"/>
+            </a:endParaRPr>
+          </a:p>
+        </p:txBody>
+      </p:sp>
+      <p:grpSp>
+        <p:nvGrpSpPr>
+          <p:cNvPr id="38" name="Group 37">
+            <a:extLst>
+              <a:ext uri="{FF2B5EF4-FFF2-40B4-BE49-F238E27FC236}">
+                <a16:creationId xmlns:a16="http://schemas.microsoft.com/office/drawing/2014/main" id="{AB42C8EF-A875-051C-D983-CAEC301E39E6}"/>
+              </a:ext>
+            </a:extLst>
+          </p:cNvPr>
+          <p:cNvGrpSpPr/>
+          <p:nvPr/>
+        </p:nvGrpSpPr>
+        <p:grpSpPr>
+          <a:xfrm>
+            <a:off x="5705107" y="4873500"/>
+            <a:ext cx="771421" cy="944853"/>
+            <a:chOff x="5689577" y="3579964"/>
+            <a:chExt cx="771421" cy="944853"/>
+          </a:xfrm>
+        </p:grpSpPr>
+        <p:sp>
+          <p:nvSpPr>
+            <p:cNvPr id="39" name="Rectangle 13">
+              <a:extLst>
+                <a:ext uri="{FF2B5EF4-FFF2-40B4-BE49-F238E27FC236}">
+                  <a16:creationId xmlns:a16="http://schemas.microsoft.com/office/drawing/2014/main" id="{D6FE7F10-D701-FE3F-2894-D5D0CA913F10}"/>
+                </a:ext>
+              </a:extLst>
+            </p:cNvPr>
+            <p:cNvSpPr/>
+            <p:nvPr/>
+          </p:nvSpPr>
+          <p:spPr>
+            <a:xfrm>
+              <a:off x="5689577" y="4032525"/>
+              <a:ext cx="771421" cy="250978"/>
+            </a:xfrm>
+            <a:prstGeom prst="rect">
+              <a:avLst/>
+            </a:prstGeom>
+            <a:solidFill>
+              <a:schemeClr val="bg1">
+                <a:lumMod val="95000"/>
+              </a:schemeClr>
+            </a:solidFill>
+            <a:ln w="19050">
+              <a:solidFill>
+                <a:schemeClr val="bg2"/>
+              </a:solidFill>
+            </a:ln>
+          </p:spPr>
+          <p:style>
+            <a:lnRef idx="2">
+              <a:schemeClr val="accent1">
+                <a:shade val="50000"/>
+              </a:schemeClr>
+            </a:lnRef>
+            <a:fillRef idx="1">
+              <a:schemeClr val="accent1"/>
+            </a:fillRef>
+            <a:effectRef idx="0">
+              <a:schemeClr val="accent1"/>
+            </a:effectRef>
+            <a:fontRef idx="minor">
+              <a:schemeClr val="lt1"/>
+            </a:fontRef>
+          </p:style>
+          <p:txBody>
+            <a:bodyPr lIns="0" rIns="0" rtlCol="0" anchor="ctr"/>
+            <a:lstStyle/>
+            <a:p>
+              <a:pPr marL="0" marR="0" lvl="0" indent="0" algn="ctr" defTabSz="914400" rtl="0" eaLnBrk="1" fontAlgn="auto" latinLnBrk="0" hangingPunct="1">
+                <a:lnSpc>
+                  <a:spcPct val="100000"/>
+                </a:lnSpc>
+                <a:spcBef>
+                  <a:spcPts val="0"/>
+                </a:spcBef>
+                <a:spcAft>
+                  <a:spcPts val="0"/>
+                </a:spcAft>
+                <a:buClrTx/>
+                <a:buSzTx/>
+                <a:buFontTx/>
+                <a:buNone/>
+                <a:tabLst/>
+                <a:defRPr/>
+              </a:pPr>
+              <a:r>
+                <a:rPr kumimoji="0" lang="en-US" sz="900" b="0" i="0" u="none" strike="noStrike" kern="1200" cap="none" spc="0" normalizeH="0" baseline="0" noProof="0" dirty="0">
+                  <a:ln>
+                    <a:noFill/>
+                  </a:ln>
+                  <a:solidFill>
+                    <a:prstClr val="black"/>
+                  </a:solidFill>
+                  <a:effectLst/>
+                  <a:uLnTx/>
+                  <a:uFillTx/>
+                  <a:ea typeface="+mn-ea"/>
+                  <a:cs typeface="+mn-cs"/>
+                </a:rPr>
+                <a:t>Network</a:t>
+              </a:r>
+            </a:p>
+          </p:txBody>
+        </p:sp>
+        <p:sp>
+          <p:nvSpPr>
+            <p:cNvPr id="41" name="Rectangle: Rounded Corners 14">
+              <a:extLst>
+                <a:ext uri="{FF2B5EF4-FFF2-40B4-BE49-F238E27FC236}">
+                  <a16:creationId xmlns:a16="http://schemas.microsoft.com/office/drawing/2014/main" id="{A5838CCE-AD1C-28B3-E499-B3305257C7AD}"/>
+                </a:ext>
+              </a:extLst>
+            </p:cNvPr>
+            <p:cNvSpPr/>
+            <p:nvPr/>
+          </p:nvSpPr>
+          <p:spPr>
+            <a:xfrm>
+              <a:off x="5689577" y="3709338"/>
+              <a:ext cx="771420" cy="815479"/>
+            </a:xfrm>
+            <a:prstGeom prst="roundRect">
+              <a:avLst/>
+            </a:prstGeom>
+            <a:noFill/>
+            <a:ln w="19050">
+              <a:solidFill>
+                <a:schemeClr val="tx1"/>
+              </a:solidFill>
+            </a:ln>
+          </p:spPr>
+          <p:style>
+            <a:lnRef idx="2">
+              <a:schemeClr val="accent1">
+                <a:shade val="50000"/>
+              </a:schemeClr>
+            </a:lnRef>
+            <a:fillRef idx="1">
+              <a:schemeClr val="accent1"/>
+            </a:fillRef>
+            <a:effectRef idx="0">
+              <a:schemeClr val="accent1"/>
+            </a:effectRef>
+            <a:fontRef idx="minor">
+              <a:schemeClr val="lt1"/>
+            </a:fontRef>
+          </p:style>
+          <p:txBody>
+            <a:bodyPr lIns="45720" tIns="0" bIns="9144" rtlCol="0" anchor="b" anchorCtr="0"/>
+            <a:lstStyle/>
+            <a:p>
+              <a:pPr lvl="0">
+                <a:defRPr/>
+              </a:pPr>
+              <a:r>
+                <a:rPr lang="en-US" sz="800" dirty="0">
+                  <a:solidFill>
+                    <a:prstClr val="black"/>
+                  </a:solidFill>
+                </a:rPr>
+                <a:t>network</a:t>
+              </a:r>
+              <a:endParaRPr kumimoji="0" lang="en-US" sz="800" b="0" i="0" u="none" strike="noStrike" kern="1200" cap="none" spc="0" normalizeH="0" baseline="0" noProof="0" dirty="0">
+                <a:ln>
+                  <a:noFill/>
+                </a:ln>
+                <a:solidFill>
+                  <a:prstClr val="black"/>
+                </a:solidFill>
+                <a:effectLst/>
+                <a:uLnTx/>
+                <a:uFillTx/>
+                <a:ea typeface="+mn-ea"/>
+                <a:cs typeface="+mn-cs"/>
+              </a:endParaRPr>
+            </a:p>
+          </p:txBody>
+        </p:sp>
+        <p:sp>
+          <p:nvSpPr>
+            <p:cNvPr id="42" name="Arrow: Chevron 15">
+              <a:extLst>
+                <a:ext uri="{FF2B5EF4-FFF2-40B4-BE49-F238E27FC236}">
+                  <a16:creationId xmlns:a16="http://schemas.microsoft.com/office/drawing/2014/main" id="{63E592DE-1E5E-930E-0497-0480A53490C2}"/>
+                </a:ext>
+              </a:extLst>
+            </p:cNvPr>
+            <p:cNvSpPr/>
+            <p:nvPr/>
+          </p:nvSpPr>
+          <p:spPr>
+            <a:xfrm rot="5400000">
+              <a:off x="5781791" y="3624964"/>
+              <a:ext cx="270000" cy="180000"/>
+            </a:xfrm>
+            <a:prstGeom prst="chevron">
+              <a:avLst>
+                <a:gd name="adj" fmla="val 14000"/>
+              </a:avLst>
+            </a:prstGeom>
+            <a:solidFill>
+              <a:schemeClr val="bg1"/>
+            </a:solidFill>
+            <a:ln w="12700">
+              <a:solidFill>
+                <a:schemeClr val="tx1"/>
+              </a:solidFill>
+            </a:ln>
+          </p:spPr>
+          <p:style>
+            <a:lnRef idx="2">
+              <a:schemeClr val="accent1">
+                <a:shade val="50000"/>
+              </a:schemeClr>
+            </a:lnRef>
+            <a:fillRef idx="1">
+              <a:schemeClr val="accent1"/>
+            </a:fillRef>
+            <a:effectRef idx="0">
+              <a:schemeClr val="accent1"/>
+            </a:effectRef>
+            <a:fontRef idx="minor">
+              <a:schemeClr val="lt1"/>
+            </a:fontRef>
+          </p:style>
+          <p:txBody>
+            <a:bodyPr tIns="0" rtlCol="0" anchor="t" anchorCtr="0"/>
+            <a:lstStyle/>
+            <a:p>
+              <a:pPr marL="0" marR="0" lvl="0" indent="0" algn="l" defTabSz="914400" rtl="0" eaLnBrk="1" fontAlgn="auto" latinLnBrk="0" hangingPunct="1">
+                <a:lnSpc>
+                  <a:spcPct val="100000"/>
+                </a:lnSpc>
+                <a:spcBef>
+                  <a:spcPts val="0"/>
+                </a:spcBef>
+                <a:spcAft>
+                  <a:spcPts val="0"/>
+                </a:spcAft>
+                <a:buClrTx/>
+                <a:buSzTx/>
+                <a:buFontTx/>
+                <a:buNone/>
+                <a:tabLst/>
+                <a:defRPr/>
+              </a:pPr>
+              <a:endParaRPr kumimoji="0" lang="en-US" sz="1000" b="0" i="0" u="none" strike="noStrike" kern="1200" cap="none" spc="0" normalizeH="0" baseline="0" noProof="0">
+                <a:ln>
+                  <a:noFill/>
+                </a:ln>
+                <a:solidFill>
+                  <a:prstClr val="black"/>
+                </a:solidFill>
+                <a:effectLst/>
+                <a:uLnTx/>
+                <a:uFillTx/>
+                <a:ea typeface="+mn-ea"/>
+                <a:cs typeface="+mn-cs"/>
+              </a:endParaRPr>
+            </a:p>
+          </p:txBody>
+        </p:sp>
+        <p:sp>
+          <p:nvSpPr>
+            <p:cNvPr id="43" name="Arrow: Chevron 15">
+              <a:extLst>
+                <a:ext uri="{FF2B5EF4-FFF2-40B4-BE49-F238E27FC236}">
+                  <a16:creationId xmlns:a16="http://schemas.microsoft.com/office/drawing/2014/main" id="{FE41CB94-606F-E1D3-BC01-D676F7B9A8BA}"/>
+                </a:ext>
+              </a:extLst>
+            </p:cNvPr>
+            <p:cNvSpPr/>
+            <p:nvPr/>
+          </p:nvSpPr>
+          <p:spPr>
+            <a:xfrm rot="5400000">
+              <a:off x="6098783" y="3624964"/>
+              <a:ext cx="270000" cy="180000"/>
+            </a:xfrm>
+            <a:prstGeom prst="chevron">
+              <a:avLst>
+                <a:gd name="adj" fmla="val 14000"/>
+              </a:avLst>
+            </a:prstGeom>
+            <a:solidFill>
+              <a:schemeClr val="bg1"/>
+            </a:solidFill>
+            <a:ln w="12700">
+              <a:solidFill>
+                <a:schemeClr val="tx1"/>
+              </a:solidFill>
+            </a:ln>
+          </p:spPr>
+          <p:style>
+            <a:lnRef idx="2">
+              <a:schemeClr val="accent1">
+                <a:shade val="50000"/>
+              </a:schemeClr>
+            </a:lnRef>
+            <a:fillRef idx="1">
+              <a:schemeClr val="accent1"/>
+            </a:fillRef>
+            <a:effectRef idx="0">
+              <a:schemeClr val="accent1"/>
+            </a:effectRef>
+            <a:fontRef idx="minor">
+              <a:schemeClr val="lt1"/>
+            </a:fontRef>
+          </p:style>
+          <p:txBody>
+            <a:bodyPr tIns="0" rtlCol="0" anchor="t" anchorCtr="0"/>
+            <a:lstStyle/>
+            <a:p>
+              <a:pPr marL="0" marR="0" lvl="0" indent="0" algn="l" defTabSz="914400" rtl="0" eaLnBrk="1" fontAlgn="auto" latinLnBrk="0" hangingPunct="1">
+                <a:lnSpc>
+                  <a:spcPct val="100000"/>
+                </a:lnSpc>
+                <a:spcBef>
+                  <a:spcPts val="0"/>
+                </a:spcBef>
+                <a:spcAft>
+                  <a:spcPts val="0"/>
+                </a:spcAft>
+                <a:buClrTx/>
+                <a:buSzTx/>
+                <a:buFontTx/>
+                <a:buNone/>
+                <a:tabLst/>
+                <a:defRPr/>
+              </a:pPr>
+              <a:endParaRPr kumimoji="0" lang="en-US" sz="1000" b="0" i="0" u="none" strike="noStrike" kern="1200" cap="none" spc="0" normalizeH="0" baseline="0" noProof="0">
+                <a:ln>
+                  <a:noFill/>
+                </a:ln>
+                <a:solidFill>
+                  <a:prstClr val="black"/>
+                </a:solidFill>
+                <a:effectLst/>
+                <a:uLnTx/>
+                <a:uFillTx/>
+                <a:ea typeface="+mn-ea"/>
+                <a:cs typeface="+mn-cs"/>
+              </a:endParaRPr>
+            </a:p>
+          </p:txBody>
+        </p:sp>
+      </p:grpSp>
+      <p:sp>
+        <p:nvSpPr>
+          <p:cNvPr id="44" name="Flowchart: Off-page Connector 24">
+            <a:extLst>
+              <a:ext uri="{FF2B5EF4-FFF2-40B4-BE49-F238E27FC236}">
+                <a16:creationId xmlns:a16="http://schemas.microsoft.com/office/drawing/2014/main" id="{B98CFE2C-A657-3078-33D1-B716ABDEE7BA}"/>
+              </a:ext>
+            </a:extLst>
+          </p:cNvPr>
+          <p:cNvSpPr/>
+          <p:nvPr/>
+        </p:nvSpPr>
+        <p:spPr>
+          <a:xfrm>
+            <a:off x="5136418" y="4412466"/>
+            <a:ext cx="180000" cy="270000"/>
+          </a:xfrm>
+          <a:prstGeom prst="flowChartOffpageConnector">
+            <a:avLst/>
+          </a:prstGeom>
+          <a:solidFill>
+            <a:schemeClr val="bg1"/>
+          </a:solidFill>
+          <a:ln w="19050">
+            <a:solidFill>
+              <a:schemeClr val="tx1"/>
+            </a:solidFill>
+          </a:ln>
+        </p:spPr>
+        <p:style>
+          <a:lnRef idx="2">
+            <a:schemeClr val="accent1">
+              <a:shade val="50000"/>
+            </a:schemeClr>
+          </a:lnRef>
+          <a:fillRef idx="1">
+            <a:schemeClr val="accent1"/>
+          </a:fillRef>
+          <a:effectRef idx="0">
+            <a:schemeClr val="accent1"/>
+          </a:effectRef>
+          <a:fontRef idx="minor">
+            <a:schemeClr val="lt1"/>
+          </a:fontRef>
+        </p:style>
+        <p:txBody>
+          <a:bodyPr tIns="0" rtlCol="0" anchor="t" anchorCtr="0"/>
+          <a:lstStyle/>
+          <a:p>
+            <a:pPr marL="0" marR="0" lvl="0" indent="0" algn="l" defTabSz="914400" rtl="0" eaLnBrk="1" fontAlgn="auto" latinLnBrk="0" hangingPunct="1">
+              <a:lnSpc>
+                <a:spcPct val="100000"/>
+              </a:lnSpc>
+              <a:spcBef>
+                <a:spcPts val="0"/>
+              </a:spcBef>
+              <a:spcAft>
+                <a:spcPts val="0"/>
+              </a:spcAft>
+              <a:buClrTx/>
+              <a:buSzTx/>
+              <a:buFontTx/>
+              <a:buNone/>
+              <a:tabLst/>
+              <a:defRPr/>
+            </a:pPr>
+            <a:endParaRPr kumimoji="0" lang="en-US" sz="1000" b="0" i="0" u="none" strike="noStrike" kern="1200" cap="none" spc="0" normalizeH="0" baseline="0" noProof="0">
+              <a:ln>
+                <a:noFill/>
+              </a:ln>
+              <a:solidFill>
+                <a:prstClr val="black"/>
+              </a:solidFill>
+              <a:effectLst/>
+              <a:uLnTx/>
+              <a:uFillTx/>
+              <a:ea typeface="+mn-ea"/>
+              <a:cs typeface="+mn-cs"/>
+            </a:endParaRPr>
+          </a:p>
+        </p:txBody>
+      </p:sp>
+      <p:sp>
+        <p:nvSpPr>
+          <p:cNvPr id="48" name="Flowchart: Off-page Connector 24">
+            <a:extLst>
+              <a:ext uri="{FF2B5EF4-FFF2-40B4-BE49-F238E27FC236}">
+                <a16:creationId xmlns:a16="http://schemas.microsoft.com/office/drawing/2014/main" id="{25E7FAED-F43B-A9FB-9120-03E022625F99}"/>
+              </a:ext>
+            </a:extLst>
+          </p:cNvPr>
+          <p:cNvSpPr/>
+          <p:nvPr/>
+        </p:nvSpPr>
+        <p:spPr>
+          <a:xfrm>
+            <a:off x="6834154" y="4412466"/>
+            <a:ext cx="180000" cy="270000"/>
+          </a:xfrm>
+          <a:prstGeom prst="flowChartOffpageConnector">
+            <a:avLst/>
+          </a:prstGeom>
+          <a:solidFill>
+            <a:schemeClr val="bg1"/>
+          </a:solidFill>
+          <a:ln w="19050">
+            <a:solidFill>
+              <a:schemeClr val="tx1"/>
+            </a:solidFill>
+          </a:ln>
+        </p:spPr>
+        <p:style>
+          <a:lnRef idx="2">
+            <a:schemeClr val="accent1">
+              <a:shade val="50000"/>
+            </a:schemeClr>
+          </a:lnRef>
+          <a:fillRef idx="1">
+            <a:schemeClr val="accent1"/>
+          </a:fillRef>
+          <a:effectRef idx="0">
+            <a:schemeClr val="accent1"/>
+          </a:effectRef>
+          <a:fontRef idx="minor">
+            <a:schemeClr val="lt1"/>
+          </a:fontRef>
+        </p:style>
+        <p:txBody>
+          <a:bodyPr tIns="0" rtlCol="0" anchor="t" anchorCtr="0"/>
+          <a:lstStyle/>
+          <a:p>
+            <a:pPr marL="0" marR="0" lvl="0" indent="0" algn="l" defTabSz="914400" rtl="0" eaLnBrk="1" fontAlgn="auto" latinLnBrk="0" hangingPunct="1">
+              <a:lnSpc>
+                <a:spcPct val="100000"/>
+              </a:lnSpc>
+              <a:spcBef>
+                <a:spcPts val="0"/>
+              </a:spcBef>
+              <a:spcAft>
+                <a:spcPts val="0"/>
+              </a:spcAft>
+              <a:buClrTx/>
+              <a:buSzTx/>
+              <a:buFontTx/>
+              <a:buNone/>
+              <a:tabLst/>
+              <a:defRPr/>
+            </a:pPr>
+            <a:endParaRPr kumimoji="0" lang="en-US" sz="1000" b="0" i="0" u="none" strike="noStrike" kern="1200" cap="none" spc="0" normalizeH="0" baseline="0" noProof="0">
+              <a:ln>
+                <a:noFill/>
+              </a:ln>
+              <a:solidFill>
+                <a:prstClr val="black"/>
+              </a:solidFill>
+              <a:effectLst/>
+              <a:uLnTx/>
+              <a:uFillTx/>
+              <a:ea typeface="+mn-ea"/>
+              <a:cs typeface="+mn-cs"/>
+            </a:endParaRPr>
+          </a:p>
+        </p:txBody>
+      </p:sp>
+      <p:cxnSp>
+        <p:nvCxnSpPr>
+          <p:cNvPr id="49" name="Straight Arrow Connector 45">
+            <a:extLst>
+              <a:ext uri="{FF2B5EF4-FFF2-40B4-BE49-F238E27FC236}">
+                <a16:creationId xmlns:a16="http://schemas.microsoft.com/office/drawing/2014/main" id="{10293860-EDDC-D3A6-DDA1-14A11D473034}"/>
+              </a:ext>
+            </a:extLst>
+          </p:cNvPr>
+          <p:cNvCxnSpPr>
+            <a:cxnSpLocks/>
+            <a:stCxn id="44" idx="2"/>
+            <a:endCxn id="42" idx="1"/>
+          </p:cNvCxnSpPr>
+          <p:nvPr/>
+        </p:nvCxnSpPr>
+        <p:spPr>
+          <a:xfrm>
+            <a:off x="5226418" y="4682466"/>
+            <a:ext cx="705903" cy="216234"/>
+          </a:xfrm>
+          <a:prstGeom prst="straightConnector1">
+            <a:avLst/>
+          </a:prstGeom>
+          <a:ln w="12700">
+            <a:solidFill>
+              <a:schemeClr val="tx1"/>
+            </a:solidFill>
+            <a:tailEnd type="triangle"/>
+          </a:ln>
+        </p:spPr>
+        <p:style>
+          <a:lnRef idx="1">
+            <a:schemeClr val="accent1"/>
+          </a:lnRef>
+          <a:fillRef idx="0">
+            <a:schemeClr val="accent1"/>
+          </a:fillRef>
+          <a:effectRef idx="0">
+            <a:schemeClr val="accent1"/>
+          </a:effectRef>
+          <a:fontRef idx="minor">
+            <a:schemeClr val="tx1"/>
+          </a:fontRef>
+        </p:style>
+      </p:cxnSp>
+      <p:cxnSp>
+        <p:nvCxnSpPr>
+          <p:cNvPr id="56" name="Straight Arrow Connector 45">
+            <a:extLst>
+              <a:ext uri="{FF2B5EF4-FFF2-40B4-BE49-F238E27FC236}">
+                <a16:creationId xmlns:a16="http://schemas.microsoft.com/office/drawing/2014/main" id="{1236C055-50E6-2974-FD4C-0DEFEC52AD6D}"/>
+              </a:ext>
+            </a:extLst>
+          </p:cNvPr>
+          <p:cNvCxnSpPr>
+            <a:cxnSpLocks/>
+            <a:stCxn id="48" idx="2"/>
+            <a:endCxn id="43" idx="1"/>
+          </p:cNvCxnSpPr>
+          <p:nvPr/>
+        </p:nvCxnSpPr>
+        <p:spPr>
+          <a:xfrm flipH="1">
+            <a:off x="6249313" y="4682466"/>
+            <a:ext cx="674841" cy="216234"/>
+          </a:xfrm>
+          <a:prstGeom prst="straightConnector1">
+            <a:avLst/>
+          </a:prstGeom>
+          <a:ln w="12700">
+            <a:solidFill>
+              <a:schemeClr val="tx1"/>
+            </a:solidFill>
+            <a:tailEnd type="triangle"/>
+          </a:ln>
+        </p:spPr>
+        <p:style>
+          <a:lnRef idx="1">
+            <a:schemeClr val="accent1"/>
+          </a:lnRef>
+          <a:fillRef idx="0">
+            <a:schemeClr val="accent1"/>
+          </a:fillRef>
+          <a:effectRef idx="0">
+            <a:schemeClr val="accent1"/>
+          </a:effectRef>
+          <a:fontRef idx="minor">
+            <a:schemeClr val="tx1"/>
+          </a:fontRef>
+        </p:style>
+      </p:cxnSp>
+      <p:sp>
+        <p:nvSpPr>
+          <p:cNvPr id="59" name="CasellaDiTesto 15">
+            <a:extLst>
+              <a:ext uri="{FF2B5EF4-FFF2-40B4-BE49-F238E27FC236}">
+                <a16:creationId xmlns:a16="http://schemas.microsoft.com/office/drawing/2014/main" id="{4C10C0DE-417B-1764-C82B-A5ECC81D6369}"/>
+              </a:ext>
+            </a:extLst>
+          </p:cNvPr>
+          <p:cNvSpPr txBox="1"/>
+          <p:nvPr/>
+        </p:nvSpPr>
+        <p:spPr>
+          <a:xfrm>
+            <a:off x="5041886" y="4706846"/>
+            <a:ext cx="895928" cy="138499"/>
+          </a:xfrm>
+          <a:prstGeom prst="rect">
+            <a:avLst/>
+          </a:prstGeom>
+          <a:solidFill>
+            <a:schemeClr val="bg1"/>
+          </a:solidFill>
+        </p:spPr>
+        <p:txBody>
+          <a:bodyPr wrap="square" lIns="0" tIns="0" rIns="0" bIns="0" rtlCol="0">
+            <a:spAutoFit/>
+          </a:bodyPr>
+          <a:lstStyle/>
+          <a:p>
+            <a:pPr algn="ctr"/>
+            <a:r>
+              <a:rPr lang="it-IT" sz="900" dirty="0"/>
+              <a:t>LinksTo</a:t>
+            </a:r>
+          </a:p>
+        </p:txBody>
+      </p:sp>
+      <p:sp>
+        <p:nvSpPr>
+          <p:cNvPr id="60" name="CasellaDiTesto 15">
+            <a:extLst>
+              <a:ext uri="{FF2B5EF4-FFF2-40B4-BE49-F238E27FC236}">
+                <a16:creationId xmlns:a16="http://schemas.microsoft.com/office/drawing/2014/main" id="{89456A4C-2B78-DD50-E00B-530C80AFD4EB}"/>
+              </a:ext>
+            </a:extLst>
+          </p:cNvPr>
+          <p:cNvSpPr txBox="1"/>
+          <p:nvPr/>
+        </p:nvSpPr>
+        <p:spPr>
+          <a:xfrm>
+            <a:off x="6256639" y="4702314"/>
+            <a:ext cx="895928" cy="138499"/>
+          </a:xfrm>
+          <a:prstGeom prst="rect">
+            <a:avLst/>
+          </a:prstGeom>
+          <a:solidFill>
+            <a:schemeClr val="bg1"/>
+          </a:solidFill>
+        </p:spPr>
+        <p:txBody>
+          <a:bodyPr wrap="square" lIns="0" tIns="0" rIns="0" bIns="0" rtlCol="0">
+            <a:spAutoFit/>
+          </a:bodyPr>
+          <a:lstStyle/>
+          <a:p>
+            <a:pPr algn="ctr"/>
+            <a:r>
+              <a:rPr lang="it-IT" sz="900" dirty="0"/>
+              <a:t>LinksTo</a:t>
+            </a:r>
+          </a:p>
+        </p:txBody>
+      </p:sp>
+      <p:sp>
+        <p:nvSpPr>
+          <p:cNvPr id="61" name="Rectangle: Rounded Corners 63">
+            <a:extLst>
+              <a:ext uri="{FF2B5EF4-FFF2-40B4-BE49-F238E27FC236}">
+                <a16:creationId xmlns:a16="http://schemas.microsoft.com/office/drawing/2014/main" id="{640022E2-4E54-EED1-28DC-48FCA3C567B0}"/>
+              </a:ext>
+            </a:extLst>
+          </p:cNvPr>
+          <p:cNvSpPr/>
+          <p:nvPr/>
+        </p:nvSpPr>
+        <p:spPr>
+          <a:xfrm>
+            <a:off x="7890331" y="5096276"/>
+            <a:ext cx="1545903" cy="1083735"/>
+          </a:xfrm>
+          <a:prstGeom prst="roundRect">
+            <a:avLst/>
+          </a:prstGeom>
+          <a:noFill/>
+          <a:ln w="19050">
+            <a:prstDash val="sysDash"/>
+          </a:ln>
+        </p:spPr>
+        <p:style>
+          <a:lnRef idx="2">
+            <a:schemeClr val="accent1">
+              <a:shade val="15000"/>
+            </a:schemeClr>
+          </a:lnRef>
+          <a:fillRef idx="1">
+            <a:schemeClr val="accent1"/>
+          </a:fillRef>
+          <a:effectRef idx="0">
+            <a:schemeClr val="accent1"/>
+          </a:effectRef>
+          <a:fontRef idx="minor">
+            <a:schemeClr val="lt1"/>
+          </a:fontRef>
+        </p:style>
+        <p:txBody>
+          <a:bodyPr rtlCol="0" anchor="ctr" anchorCtr="0"/>
+          <a:lstStyle/>
+          <a:p>
+            <a:pPr algn="ctr"/>
+            <a:r>
+              <a:rPr lang="en-US" sz="1100" dirty="0">
+                <a:solidFill>
+                  <a:schemeClr val="tx1"/>
+                </a:solidFill>
+              </a:rPr>
+              <a:t>Substituting</a:t>
+            </a:r>
+            <a:br>
+              <a:rPr lang="en-US" sz="1100" dirty="0">
+                <a:solidFill>
+                  <a:schemeClr val="tx1"/>
+                </a:solidFill>
+              </a:rPr>
+            </a:br>
+            <a:r>
+              <a:rPr lang="en-US" sz="1100" dirty="0">
+                <a:solidFill>
+                  <a:schemeClr val="tx1"/>
+                </a:solidFill>
+              </a:rPr>
+              <a:t>Service Template</a:t>
+            </a:r>
+            <a:br>
+              <a:rPr lang="en-US" sz="1100" dirty="0">
+                <a:solidFill>
+                  <a:schemeClr val="tx1"/>
+                </a:solidFill>
+              </a:rPr>
+            </a:br>
+            <a:r>
+              <a:rPr lang="en-US" sz="1100" dirty="0">
+                <a:solidFill>
+                  <a:schemeClr val="tx1"/>
+                </a:solidFill>
+              </a:rPr>
+              <a:t>(Platform)</a:t>
+            </a:r>
+          </a:p>
+        </p:txBody>
+      </p:sp>
+      <p:cxnSp>
+        <p:nvCxnSpPr>
+          <p:cNvPr id="62" name="Straight Arrow Connector 134">
+            <a:extLst>
+              <a:ext uri="{FF2B5EF4-FFF2-40B4-BE49-F238E27FC236}">
+                <a16:creationId xmlns:a16="http://schemas.microsoft.com/office/drawing/2014/main" id="{424ACF01-B3E3-9A31-598D-E747969B69D8}"/>
+              </a:ext>
+            </a:extLst>
+          </p:cNvPr>
+          <p:cNvCxnSpPr>
+            <a:cxnSpLocks/>
+            <a:stCxn id="41" idx="3"/>
+            <a:endCxn id="61" idx="1"/>
+          </p:cNvCxnSpPr>
+          <p:nvPr/>
+        </p:nvCxnSpPr>
+        <p:spPr>
+          <a:xfrm>
+            <a:off x="6476527" y="5410614"/>
+            <a:ext cx="1413804" cy="227530"/>
+          </a:xfrm>
+          <a:prstGeom prst="straightConnector1">
+            <a:avLst/>
+          </a:prstGeom>
+          <a:ln w="28575">
+            <a:solidFill>
+              <a:schemeClr val="accent2"/>
+            </a:solidFill>
+            <a:prstDash val="sysDash"/>
+            <a:headEnd type="triangle" w="med" len="med"/>
+            <a:tailEnd type="none" w="med" len="med"/>
+          </a:ln>
+        </p:spPr>
+        <p:style>
+          <a:lnRef idx="1">
+            <a:schemeClr val="accent1"/>
+          </a:lnRef>
+          <a:fillRef idx="0">
+            <a:schemeClr val="accent1"/>
+          </a:fillRef>
+          <a:effectRef idx="0">
+            <a:schemeClr val="accent1"/>
+          </a:effectRef>
+          <a:fontRef idx="minor">
+            <a:schemeClr val="tx1"/>
+          </a:fontRef>
+        </p:style>
+      </p:cxnSp>
+      <p:sp>
+        <p:nvSpPr>
+          <p:cNvPr id="63" name="TextBox 135">
+            <a:extLst>
+              <a:ext uri="{FF2B5EF4-FFF2-40B4-BE49-F238E27FC236}">
+                <a16:creationId xmlns:a16="http://schemas.microsoft.com/office/drawing/2014/main" id="{57C9BC7C-D062-3A87-7F45-34DE4BBAE515}"/>
+              </a:ext>
+            </a:extLst>
+          </p:cNvPr>
+          <p:cNvSpPr txBox="1"/>
+          <p:nvPr/>
+        </p:nvSpPr>
+        <p:spPr>
+          <a:xfrm>
+            <a:off x="6885667" y="5479863"/>
+            <a:ext cx="533800" cy="138499"/>
+          </a:xfrm>
+          <a:prstGeom prst="rect">
+            <a:avLst/>
+          </a:prstGeom>
+          <a:solidFill>
+            <a:schemeClr val="bg1"/>
+          </a:solidFill>
+        </p:spPr>
+        <p:txBody>
+          <a:bodyPr wrap="square" lIns="0" tIns="0" rIns="0" bIns="0" rtlCol="0">
+            <a:spAutoFit/>
+          </a:bodyPr>
+          <a:lstStyle/>
+          <a:p>
+            <a:pPr algn="ctr"/>
+            <a:r>
+              <a:rPr lang="en-US" sz="900" b="1" dirty="0"/>
+              <a:t>substitutes</a:t>
+            </a:r>
+          </a:p>
+        </p:txBody>
+      </p:sp>
+      <p:sp>
+        <p:nvSpPr>
+          <p:cNvPr id="64" name="Flowchart: Multidocument 1">
+            <a:extLst>
+              <a:ext uri="{FF2B5EF4-FFF2-40B4-BE49-F238E27FC236}">
+                <a16:creationId xmlns:a16="http://schemas.microsoft.com/office/drawing/2014/main" id="{88F7E200-DA85-CA41-4F3F-5066E82E9208}"/>
+              </a:ext>
+            </a:extLst>
+          </p:cNvPr>
+          <p:cNvSpPr/>
+          <p:nvPr/>
+        </p:nvSpPr>
+        <p:spPr>
+          <a:xfrm>
+            <a:off x="8781420" y="4317074"/>
+            <a:ext cx="1021210" cy="685800"/>
+          </a:xfrm>
+          <a:prstGeom prst="flowChartMultidocument">
+            <a:avLst/>
+          </a:prstGeom>
+          <a:noFill/>
+          <a:ln w="19050" cap="flat" cmpd="sng" algn="ctr">
+            <a:solidFill>
+              <a:sysClr val="windowText" lastClr="000000"/>
+            </a:solidFill>
+            <a:prstDash val="solid"/>
+          </a:ln>
+          <a:effectLst/>
+        </p:spPr>
+        <p:txBody>
+          <a:bodyPr tIns="91440" rtlCol="0" anchor="t" anchorCtr="0"/>
+          <a:lstStyle/>
+          <a:p>
+            <a:r>
+              <a:rPr lang="en-US" sz="1100" kern="0" dirty="0">
+                <a:solidFill>
+                  <a:prstClr val="black"/>
+                </a:solidFill>
+                <a:latin typeface="Calibri" panose="020F0502020204030204"/>
+              </a:rPr>
+              <a:t>Platform</a:t>
+            </a:r>
+            <a:br>
+              <a:rPr lang="en-US" sz="1100" kern="0" dirty="0">
+                <a:solidFill>
+                  <a:prstClr val="black"/>
+                </a:solidFill>
+                <a:latin typeface="Calibri" panose="020F0502020204030204"/>
+              </a:rPr>
+            </a:br>
+            <a:r>
+              <a:rPr lang="en-US" sz="1100" kern="0" dirty="0">
+                <a:solidFill>
+                  <a:prstClr val="black"/>
+                </a:solidFill>
+                <a:latin typeface="Calibri" panose="020F0502020204030204"/>
+              </a:rPr>
+              <a:t>Profile</a:t>
+            </a:r>
+          </a:p>
+        </p:txBody>
+      </p:sp>
+    </p:spTree>
+    <p:extLst>
+      <p:ext uri="{BB962C8B-B14F-4D97-AF65-F5344CB8AC3E}">
+        <p14:creationId xmlns:p14="http://schemas.microsoft.com/office/powerpoint/2010/main" val="462828110"/>
+      </p:ext>
+    </p:extLst>
+  </p:cSld>
+  <p:clrMapOvr>
+    <a:masterClrMapping/>
+  </p:clrMapOvr>
+</p:sld>
+</file>
+
 <file path=ppt/theme/theme1.xml><?xml version="1.0" encoding="utf-8"?>
 <a:theme xmlns:a="http://schemas.openxmlformats.org/drawingml/2006/main" name="Office Theme">
   <a:themeElements>

</xml_diff>